<commit_message>
update bài 16 - 17
</commit_message>
<xml_diff>
--- a/16-17.Chơi nhạc Việt Demo skill chơi nhạc và cách quản lý file nhạc trên S3 AWS/Chơi nhạc Việt phần 1. Upload file lên S3.pptx
+++ b/16-17.Chơi nhạc Việt Demo skill chơi nhạc và cách quản lý file nhạc trên S3 AWS/Chơi nhạc Việt phần 1. Upload file lên S3.pptx
@@ -5,14 +5,16 @@
     <p:sldMasterId id="2147483648" r:id="rId1"/>
   </p:sldMasterIdLst>
   <p:notesMasterIdLst>
-    <p:notesMasterId r:id="rId7"/>
+    <p:notesMasterId r:id="rId9"/>
   </p:notesMasterIdLst>
   <p:sldIdLst>
     <p:sldId id="285" r:id="rId2"/>
     <p:sldId id="310" r:id="rId3"/>
     <p:sldId id="311" r:id="rId4"/>
     <p:sldId id="312" r:id="rId5"/>
-    <p:sldId id="308" r:id="rId6"/>
+    <p:sldId id="313" r:id="rId6"/>
+    <p:sldId id="314" r:id="rId7"/>
+    <p:sldId id="308" r:id="rId8"/>
   </p:sldIdLst>
   <p:sldSz cx="12192000" cy="6858000"/>
   <p:notesSz cx="6858000" cy="9144000"/>
@@ -142,7 +144,7 @@
   <pc:docChgLst>
     <pc:chgData name="Huong Nguyen" userId="a3438fb82b5343a2" providerId="LiveId" clId="{4E90A7CB-49F0-43FD-8832-23746F7C6B83}"/>
     <pc:docChg chg="custSel addSld modSld sldOrd">
-      <pc:chgData name="Huong Nguyen" userId="a3438fb82b5343a2" providerId="LiveId" clId="{4E90A7CB-49F0-43FD-8832-23746F7C6B83}" dt="2018-09-25T14:26:37.274" v="21"/>
+      <pc:chgData name="Huong Nguyen" userId="a3438fb82b5343a2" providerId="LiveId" clId="{4E90A7CB-49F0-43FD-8832-23746F7C6B83}" dt="2018-09-29T13:21:34.149" v="24"/>
       <pc:docMkLst>
         <pc:docMk/>
       </pc:docMkLst>
@@ -161,8 +163,8 @@
           </ac:spMkLst>
         </pc:spChg>
       </pc:sldChg>
-      <pc:sldChg chg="addSp delSp modSp modAnim">
-        <pc:chgData name="Huong Nguyen" userId="a3438fb82b5343a2" providerId="LiveId" clId="{4E90A7CB-49F0-43FD-8832-23746F7C6B83}" dt="2018-09-25T14:09:26.944" v="18"/>
+      <pc:sldChg chg="addSp delSp modSp delAnim modAnim">
+        <pc:chgData name="Huong Nguyen" userId="a3438fb82b5343a2" providerId="LiveId" clId="{4E90A7CB-49F0-43FD-8832-23746F7C6B83}" dt="2018-09-28T13:26:16.028" v="23" actId="478"/>
         <pc:sldMkLst>
           <pc:docMk/>
           <pc:sldMk cId="1195403567" sldId="310"/>
@@ -199,8 +201,8 @@
             <ac:spMk id="7" creationId="{8E011337-9199-44E3-8D44-53B35FC062AF}"/>
           </ac:spMkLst>
         </pc:spChg>
-        <pc:spChg chg="add mod ord">
-          <ac:chgData name="Huong Nguyen" userId="a3438fb82b5343a2" providerId="LiveId" clId="{4E90A7CB-49F0-43FD-8832-23746F7C6B83}" dt="2018-09-25T14:09:10.958" v="17" actId="1582"/>
+        <pc:spChg chg="add del mod ord">
+          <ac:chgData name="Huong Nguyen" userId="a3438fb82b5343a2" providerId="LiveId" clId="{4E90A7CB-49F0-43FD-8832-23746F7C6B83}" dt="2018-09-28T13:26:16.028" v="23" actId="478"/>
           <ac:spMkLst>
             <pc:docMk/>
             <pc:sldMk cId="1195403567" sldId="310"/>
@@ -454,6 +456,20 @@
           <pc:sldMk cId="918245605" sldId="312"/>
         </pc:sldMkLst>
       </pc:sldChg>
+      <pc:sldChg chg="add">
+        <pc:chgData name="Huong Nguyen" userId="a3438fb82b5343a2" providerId="LiveId" clId="{4E90A7CB-49F0-43FD-8832-23746F7C6B83}" dt="2018-09-28T13:26:12.917" v="22"/>
+        <pc:sldMkLst>
+          <pc:docMk/>
+          <pc:sldMk cId="944313172" sldId="313"/>
+        </pc:sldMkLst>
+      </pc:sldChg>
+      <pc:sldChg chg="add">
+        <pc:chgData name="Huong Nguyen" userId="a3438fb82b5343a2" providerId="LiveId" clId="{4E90A7CB-49F0-43FD-8832-23746F7C6B83}" dt="2018-09-29T13:21:34.149" v="24"/>
+        <pc:sldMkLst>
+          <pc:docMk/>
+          <pc:sldMk cId="3451230672" sldId="314"/>
+        </pc:sldMkLst>
+      </pc:sldChg>
     </pc:docChg>
   </pc:docChgLst>
 </pc:chgInfo>
@@ -541,7 +557,7 @@
           <a:p>
             <a:fld id="{7C73E1C4-0E57-49E6-A5B1-CF2F2E9F2E1A}" type="datetimeFigureOut">
               <a:rPr lang="en-US" smtClean="0"/>
-              <a:t>09/25/2018</a:t>
+              <a:t>09/29/2018</a:t>
             </a:fld>
             <a:endParaRPr lang="en-US"/>
           </a:p>
@@ -980,6 +996,177 @@
 </p:notes>
 </file>
 
+<file path=ppt/notesSlides/notesSlide3.xml><?xml version="1.0" encoding="utf-8"?>
+<p:notes xmlns:a="http://schemas.openxmlformats.org/drawingml/2006/main" xmlns:r="http://schemas.openxmlformats.org/officeDocument/2006/relationships" xmlns:p="http://schemas.openxmlformats.org/presentationml/2006/main">
+  <p:cSld>
+    <p:spTree>
+      <p:nvGrpSpPr>
+        <p:cNvPr id="1" name=""/>
+        <p:cNvGrpSpPr/>
+        <p:nvPr/>
+      </p:nvGrpSpPr>
+      <p:grpSpPr>
+        <a:xfrm>
+          <a:off x="0" y="0"/>
+          <a:ext cx="0" cy="0"/>
+          <a:chOff x="0" y="0"/>
+          <a:chExt cx="0" cy="0"/>
+        </a:xfrm>
+      </p:grpSpPr>
+      <p:sp>
+        <p:nvSpPr>
+          <p:cNvPr id="2" name="Chỗ dành sẵn cho Hình ảnh của Bản chiếu 1"/>
+          <p:cNvSpPr>
+            <a:spLocks noGrp="1" noRot="1" noChangeAspect="1"/>
+          </p:cNvSpPr>
+          <p:nvPr>
+            <p:ph type="sldImg"/>
+          </p:nvPr>
+        </p:nvSpPr>
+        <p:spPr/>
+      </p:sp>
+      <p:sp>
+        <p:nvSpPr>
+          <p:cNvPr id="3" name="Chỗ dành sẵn cho Ghi chú 2"/>
+          <p:cNvSpPr>
+            <a:spLocks noGrp="1"/>
+          </p:cNvSpPr>
+          <p:nvPr>
+            <p:ph type="body" idx="1"/>
+          </p:nvPr>
+        </p:nvSpPr>
+        <p:spPr/>
+        <p:txBody>
+          <a:bodyPr/>
+          <a:lstStyle/>
+          <a:p>
+            <a:endParaRPr lang="en-US" dirty="0"/>
+          </a:p>
+        </p:txBody>
+      </p:sp>
+      <p:sp>
+        <p:nvSpPr>
+          <p:cNvPr id="4" name="Chỗ dành sẵn cho Số hiệu Bản chiếu 3"/>
+          <p:cNvSpPr>
+            <a:spLocks noGrp="1"/>
+          </p:cNvSpPr>
+          <p:nvPr>
+            <p:ph type="sldNum" sz="quarter" idx="5"/>
+          </p:nvPr>
+        </p:nvSpPr>
+        <p:spPr/>
+        <p:txBody>
+          <a:bodyPr/>
+          <a:lstStyle/>
+          <a:p>
+            <a:fld id="{565DF8DC-7253-4D41-B5FB-31730F6BCE5E}" type="slidenum">
+              <a:rPr lang="en-US" smtClean="0"/>
+              <a:t>4</a:t>
+            </a:fld>
+            <a:endParaRPr lang="en-US"/>
+          </a:p>
+        </p:txBody>
+      </p:sp>
+    </p:spTree>
+    <p:extLst>
+      <p:ext uri="{BB962C8B-B14F-4D97-AF65-F5344CB8AC3E}">
+        <p14:creationId xmlns:p14="http://schemas.microsoft.com/office/powerpoint/2010/main" val="2369102736"/>
+      </p:ext>
+    </p:extLst>
+  </p:cSld>
+  <p:clrMapOvr>
+    <a:masterClrMapping/>
+  </p:clrMapOvr>
+</p:notes>
+</file>
+
+<file path=ppt/notesSlides/notesSlide4.xml><?xml version="1.0" encoding="utf-8"?>
+<p:notes xmlns:a="http://schemas.openxmlformats.org/drawingml/2006/main" xmlns:r="http://schemas.openxmlformats.org/officeDocument/2006/relationships" xmlns:p="http://schemas.openxmlformats.org/presentationml/2006/main">
+  <p:cSld>
+    <p:spTree>
+      <p:nvGrpSpPr>
+        <p:cNvPr id="1" name=""/>
+        <p:cNvGrpSpPr/>
+        <p:nvPr/>
+      </p:nvGrpSpPr>
+      <p:grpSpPr>
+        <a:xfrm>
+          <a:off x="0" y="0"/>
+          <a:ext cx="0" cy="0"/>
+          <a:chOff x="0" y="0"/>
+          <a:chExt cx="0" cy="0"/>
+        </a:xfrm>
+      </p:grpSpPr>
+      <p:sp>
+        <p:nvSpPr>
+          <p:cNvPr id="2" name="Chỗ dành sẵn cho Hình ảnh của Bản chiếu 1"/>
+          <p:cNvSpPr>
+            <a:spLocks noGrp="1" noRot="1" noChangeAspect="1"/>
+          </p:cNvSpPr>
+          <p:nvPr>
+            <p:ph type="sldImg"/>
+          </p:nvPr>
+        </p:nvSpPr>
+        <p:spPr/>
+      </p:sp>
+      <p:sp>
+        <p:nvSpPr>
+          <p:cNvPr id="3" name="Chỗ dành sẵn cho Ghi chú 2"/>
+          <p:cNvSpPr>
+            <a:spLocks noGrp="1"/>
+          </p:cNvSpPr>
+          <p:nvPr>
+            <p:ph type="body" idx="1"/>
+          </p:nvPr>
+        </p:nvSpPr>
+        <p:spPr/>
+        <p:txBody>
+          <a:bodyPr/>
+          <a:lstStyle/>
+          <a:p>
+            <a:endParaRPr lang="en-US" dirty="0"/>
+          </a:p>
+          <a:p>
+            <a:endParaRPr lang="en-US" dirty="0"/>
+          </a:p>
+        </p:txBody>
+      </p:sp>
+      <p:sp>
+        <p:nvSpPr>
+          <p:cNvPr id="4" name="Chỗ dành sẵn cho Số hiệu Bản chiếu 3"/>
+          <p:cNvSpPr>
+            <a:spLocks noGrp="1"/>
+          </p:cNvSpPr>
+          <p:nvPr>
+            <p:ph type="sldNum" sz="quarter" idx="10"/>
+          </p:nvPr>
+        </p:nvSpPr>
+        <p:spPr/>
+        <p:txBody>
+          <a:bodyPr/>
+          <a:lstStyle/>
+          <a:p>
+            <a:fld id="{565DF8DC-7253-4D41-B5FB-31730F6BCE5E}" type="slidenum">
+              <a:rPr lang="en-US" smtClean="0"/>
+              <a:t>5</a:t>
+            </a:fld>
+            <a:endParaRPr lang="en-US"/>
+          </a:p>
+        </p:txBody>
+      </p:sp>
+    </p:spTree>
+    <p:extLst>
+      <p:ext uri="{BB962C8B-B14F-4D97-AF65-F5344CB8AC3E}">
+        <p14:creationId xmlns:p14="http://schemas.microsoft.com/office/powerpoint/2010/main" val="27075166"/>
+      </p:ext>
+    </p:extLst>
+  </p:cSld>
+  <p:clrMapOvr>
+    <a:masterClrMapping/>
+  </p:clrMapOvr>
+</p:notes>
+</file>
+
 <file path=ppt/slideLayouts/slideLayout1.xml><?xml version="1.0" encoding="utf-8"?>
 <p:sldLayout xmlns:a="http://schemas.openxmlformats.org/drawingml/2006/main" xmlns:r="http://schemas.openxmlformats.org/officeDocument/2006/relationships" xmlns:p="http://schemas.openxmlformats.org/presentationml/2006/main" type="title" preserve="1">
   <p:cSld name="Tiêu đề Bản chiếu">
@@ -1129,7 +1316,7 @@
           <a:p>
             <a:fld id="{F1C761E4-4213-4FD4-9B54-B60716A2CCD2}" type="datetimeFigureOut">
               <a:rPr lang="en-US" smtClean="0"/>
-              <a:t>09/25/2018</a:t>
+              <a:t>09/29/2018</a:t>
             </a:fld>
             <a:endParaRPr lang="en-US"/>
           </a:p>
@@ -1329,7 +1516,7 @@
           <a:p>
             <a:fld id="{F1C761E4-4213-4FD4-9B54-B60716A2CCD2}" type="datetimeFigureOut">
               <a:rPr lang="en-US" smtClean="0"/>
-              <a:t>09/25/2018</a:t>
+              <a:t>09/29/2018</a:t>
             </a:fld>
             <a:endParaRPr lang="en-US"/>
           </a:p>
@@ -1539,7 +1726,7 @@
           <a:p>
             <a:fld id="{F1C761E4-4213-4FD4-9B54-B60716A2CCD2}" type="datetimeFigureOut">
               <a:rPr lang="en-US" smtClean="0"/>
-              <a:t>09/25/2018</a:t>
+              <a:t>09/29/2018</a:t>
             </a:fld>
             <a:endParaRPr lang="en-US"/>
           </a:p>
@@ -1971,7 +2158,7 @@
           <a:p>
             <a:fld id="{F1C761E4-4213-4FD4-9B54-B60716A2CCD2}" type="datetimeFigureOut">
               <a:rPr lang="en-US" smtClean="0"/>
-              <a:t>09/25/2018</a:t>
+              <a:t>09/29/2018</a:t>
             </a:fld>
             <a:endParaRPr lang="en-US"/>
           </a:p>
@@ -2247,7 +2434,7 @@
           <a:p>
             <a:fld id="{F1C761E4-4213-4FD4-9B54-B60716A2CCD2}" type="datetimeFigureOut">
               <a:rPr lang="en-US" smtClean="0"/>
-              <a:t>09/25/2018</a:t>
+              <a:t>09/29/2018</a:t>
             </a:fld>
             <a:endParaRPr lang="en-US"/>
           </a:p>
@@ -2515,7 +2702,7 @@
           <a:p>
             <a:fld id="{F1C761E4-4213-4FD4-9B54-B60716A2CCD2}" type="datetimeFigureOut">
               <a:rPr lang="en-US" smtClean="0"/>
-              <a:t>09/25/2018</a:t>
+              <a:t>09/29/2018</a:t>
             </a:fld>
             <a:endParaRPr lang="en-US"/>
           </a:p>
@@ -2930,7 +3117,7 @@
           <a:p>
             <a:fld id="{F1C761E4-4213-4FD4-9B54-B60716A2CCD2}" type="datetimeFigureOut">
               <a:rPr lang="en-US" smtClean="0"/>
-              <a:t>09/25/2018</a:t>
+              <a:t>09/29/2018</a:t>
             </a:fld>
             <a:endParaRPr lang="en-US"/>
           </a:p>
@@ -3072,7 +3259,7 @@
           <a:p>
             <a:fld id="{F1C761E4-4213-4FD4-9B54-B60716A2CCD2}" type="datetimeFigureOut">
               <a:rPr lang="en-US" smtClean="0"/>
-              <a:t>09/25/2018</a:t>
+              <a:t>09/29/2018</a:t>
             </a:fld>
             <a:endParaRPr lang="en-US"/>
           </a:p>
@@ -3185,7 +3372,7 @@
           <a:p>
             <a:fld id="{F1C761E4-4213-4FD4-9B54-B60716A2CCD2}" type="datetimeFigureOut">
               <a:rPr lang="en-US" smtClean="0"/>
-              <a:t>09/25/2018</a:t>
+              <a:t>09/29/2018</a:t>
             </a:fld>
             <a:endParaRPr lang="en-US"/>
           </a:p>
@@ -3498,7 +3685,7 @@
           <a:p>
             <a:fld id="{F1C761E4-4213-4FD4-9B54-B60716A2CCD2}" type="datetimeFigureOut">
               <a:rPr lang="en-US" smtClean="0"/>
-              <a:t>09/25/2018</a:t>
+              <a:t>09/29/2018</a:t>
             </a:fld>
             <a:endParaRPr lang="en-US"/>
           </a:p>
@@ -3787,7 +3974,7 @@
           <a:p>
             <a:fld id="{F1C761E4-4213-4FD4-9B54-B60716A2CCD2}" type="datetimeFigureOut">
               <a:rPr lang="en-US" smtClean="0"/>
-              <a:t>09/25/2018</a:t>
+              <a:t>09/29/2018</a:t>
             </a:fld>
             <a:endParaRPr lang="en-US"/>
           </a:p>
@@ -4030,7 +4217,7 @@
           <a:p>
             <a:fld id="{F1C761E4-4213-4FD4-9B54-B60716A2CCD2}" type="datetimeFigureOut">
               <a:rPr lang="en-US" smtClean="0"/>
-              <a:t>09/25/2018</a:t>
+              <a:t>09/29/2018</a:t>
             </a:fld>
             <a:endParaRPr lang="en-US"/>
           </a:p>
@@ -4658,56 +4845,6 @@
       </p:grpSpPr>
       <p:sp>
         <p:nvSpPr>
-          <p:cNvPr id="8" name="Hình chữ nhật 7">
-            <a:extLst>
-              <a:ext uri="{FF2B5EF4-FFF2-40B4-BE49-F238E27FC236}">
-                <a16:creationId xmlns:a16="http://schemas.microsoft.com/office/drawing/2014/main" id="{9D248E33-3853-4174-A5E1-DE4AA09E282C}"/>
-              </a:ext>
-            </a:extLst>
-          </p:cNvPr>
-          <p:cNvSpPr/>
-          <p:nvPr/>
-        </p:nvSpPr>
-        <p:spPr>
-          <a:xfrm>
-            <a:off x="1500874" y="1948621"/>
-            <a:ext cx="2660728" cy="2622015"/>
-          </a:xfrm>
-          <a:prstGeom prst="rect">
-            <a:avLst/>
-          </a:prstGeom>
-          <a:ln w="19050">
-            <a:solidFill>
-              <a:srgbClr val="FF0000"/>
-            </a:solidFill>
-            <a:prstDash val="lgDash"/>
-          </a:ln>
-        </p:spPr>
-        <p:style>
-          <a:lnRef idx="2">
-            <a:schemeClr val="accent1"/>
-          </a:lnRef>
-          <a:fillRef idx="1">
-            <a:schemeClr val="lt1"/>
-          </a:fillRef>
-          <a:effectRef idx="0">
-            <a:schemeClr val="accent1"/>
-          </a:effectRef>
-          <a:fontRef idx="minor">
-            <a:schemeClr val="dk1"/>
-          </a:fontRef>
-        </p:style>
-        <p:txBody>
-          <a:bodyPr rtlCol="0" anchor="ctr"/>
-          <a:lstStyle/>
-          <a:p>
-            <a:pPr algn="ctr"/>
-            <a:endParaRPr lang="en-US"/>
-          </a:p>
-        </p:txBody>
-      </p:sp>
-      <p:sp>
-        <p:nvSpPr>
           <p:cNvPr id="19" name="Title 1">
             <a:extLst>
               <a:ext uri="{FF2B5EF4-FFF2-40B4-BE49-F238E27FC236}">
@@ -6332,6 +6469,1884 @@
     <p:extLst>
       <p:ext uri="{BB962C8B-B14F-4D97-AF65-F5344CB8AC3E}">
         <p14:creationId xmlns:p14="http://schemas.microsoft.com/office/powerpoint/2010/main" val="1195403567"/>
+      </p:ext>
+    </p:extLst>
+  </p:cSld>
+  <p:clrMapOvr>
+    <a:masterClrMapping/>
+  </p:clrMapOvr>
+</p:sld>
+</file>
+
+<file path=ppt/slides/slide3.xml><?xml version="1.0" encoding="utf-8"?>
+<p:sld xmlns:a="http://schemas.openxmlformats.org/drawingml/2006/main" xmlns:r="http://schemas.openxmlformats.org/officeDocument/2006/relationships" xmlns:p="http://schemas.openxmlformats.org/presentationml/2006/main">
+  <p:cSld>
+    <p:spTree>
+      <p:nvGrpSpPr>
+        <p:cNvPr id="1" name=""/>
+        <p:cNvGrpSpPr/>
+        <p:nvPr/>
+      </p:nvGrpSpPr>
+      <p:grpSpPr>
+        <a:xfrm>
+          <a:off x="0" y="0"/>
+          <a:ext cx="0" cy="0"/>
+          <a:chOff x="0" y="0"/>
+          <a:chExt cx="0" cy="0"/>
+        </a:xfrm>
+      </p:grpSpPr>
+      <p:sp>
+        <p:nvSpPr>
+          <p:cNvPr id="2" name="Tiêu đề 1">
+            <a:extLst>
+              <a:ext uri="{FF2B5EF4-FFF2-40B4-BE49-F238E27FC236}">
+                <a16:creationId xmlns:a16="http://schemas.microsoft.com/office/drawing/2014/main" id="{395C4E5F-9B88-4AE8-AFB1-7FC0372546C2}"/>
+              </a:ext>
+            </a:extLst>
+          </p:cNvPr>
+          <p:cNvSpPr>
+            <a:spLocks noGrp="1"/>
+          </p:cNvSpPr>
+          <p:nvPr>
+            <p:ph type="title"/>
+          </p:nvPr>
+        </p:nvSpPr>
+        <p:spPr>
+          <a:xfrm>
+            <a:off x="570914" y="365125"/>
+            <a:ext cx="10515600" cy="1325563"/>
+          </a:xfrm>
+        </p:spPr>
+        <p:txBody>
+          <a:bodyPr/>
+          <a:lstStyle/>
+          <a:p>
+            <a:r>
+              <a:rPr lang="en-US" dirty="0" err="1"/>
+              <a:t>Thiết</a:t>
+            </a:r>
+            <a:r>
+              <a:rPr lang="en-US" dirty="0"/>
+              <a:t> </a:t>
+            </a:r>
+            <a:r>
+              <a:rPr lang="en-US" dirty="0" err="1"/>
+              <a:t>kế</a:t>
+            </a:r>
+            <a:r>
+              <a:rPr lang="en-US" dirty="0"/>
+              <a:t> VUI</a:t>
+            </a:r>
+          </a:p>
+        </p:txBody>
+      </p:sp>
+      <p:pic>
+        <p:nvPicPr>
+          <p:cNvPr id="8" name="Chỗ dành sẵn cho Nội dung 7">
+            <a:extLst>
+              <a:ext uri="{FF2B5EF4-FFF2-40B4-BE49-F238E27FC236}">
+                <a16:creationId xmlns:a16="http://schemas.microsoft.com/office/drawing/2014/main" id="{ADECE981-85FB-4FD2-8E6F-68206E21733B}"/>
+              </a:ext>
+            </a:extLst>
+          </p:cNvPr>
+          <p:cNvPicPr>
+            <a:picLocks noGrp="1" noChangeAspect="1"/>
+          </p:cNvPicPr>
+          <p:nvPr>
+            <p:ph idx="1"/>
+          </p:nvPr>
+        </p:nvPicPr>
+        <p:blipFill>
+          <a:blip r:embed="rId2">
+            <a:extLst>
+              <a:ext uri="{28A0092B-C50C-407E-A947-70E740481C1C}">
+                <a14:useLocalDpi xmlns:a14="http://schemas.microsoft.com/office/drawing/2010/main" val="0"/>
+              </a:ext>
+            </a:extLst>
+          </a:blip>
+          <a:stretch>
+            <a:fillRect/>
+          </a:stretch>
+        </p:blipFill>
+        <p:spPr>
+          <a:xfrm>
+            <a:off x="4832666" y="1027906"/>
+            <a:ext cx="5831728" cy="4351338"/>
+          </a:xfrm>
+        </p:spPr>
+      </p:pic>
+    </p:spTree>
+    <p:extLst>
+      <p:ext uri="{BB962C8B-B14F-4D97-AF65-F5344CB8AC3E}">
+        <p14:creationId xmlns:p14="http://schemas.microsoft.com/office/powerpoint/2010/main" val="1384107881"/>
+      </p:ext>
+    </p:extLst>
+  </p:cSld>
+  <p:clrMapOvr>
+    <a:masterClrMapping/>
+  </p:clrMapOvr>
+</p:sld>
+</file>
+
+<file path=ppt/slides/slide4.xml><?xml version="1.0" encoding="utf-8"?>
+<p:sld xmlns:a="http://schemas.openxmlformats.org/drawingml/2006/main" xmlns:r="http://schemas.openxmlformats.org/officeDocument/2006/relationships" xmlns:p="http://schemas.openxmlformats.org/presentationml/2006/main">
+  <p:cSld>
+    <p:spTree>
+      <p:nvGrpSpPr>
+        <p:cNvPr id="1" name=""/>
+        <p:cNvGrpSpPr/>
+        <p:nvPr/>
+      </p:nvGrpSpPr>
+      <p:grpSpPr>
+        <a:xfrm>
+          <a:off x="0" y="0"/>
+          <a:ext cx="0" cy="0"/>
+          <a:chOff x="0" y="0"/>
+          <a:chExt cx="0" cy="0"/>
+        </a:xfrm>
+      </p:grpSpPr>
+      <p:pic>
+        <p:nvPicPr>
+          <p:cNvPr id="4" name="Chỗ dành sẵn cho Nội dung 7">
+            <a:extLst>
+              <a:ext uri="{FF2B5EF4-FFF2-40B4-BE49-F238E27FC236}">
+                <a16:creationId xmlns:a16="http://schemas.microsoft.com/office/drawing/2014/main" id="{E4F729AF-E856-4482-9191-5A27565071F9}"/>
+              </a:ext>
+            </a:extLst>
+          </p:cNvPr>
+          <p:cNvPicPr>
+            <a:picLocks noChangeAspect="1"/>
+          </p:cNvPicPr>
+          <p:nvPr/>
+        </p:nvPicPr>
+        <p:blipFill>
+          <a:blip r:embed="rId3">
+            <a:extLst>
+              <a:ext uri="{28A0092B-C50C-407E-A947-70E740481C1C}">
+                <a14:useLocalDpi xmlns:a14="http://schemas.microsoft.com/office/drawing/2010/main" val="0"/>
+              </a:ext>
+            </a:extLst>
+          </a:blip>
+          <a:stretch>
+            <a:fillRect/>
+          </a:stretch>
+        </p:blipFill>
+        <p:spPr>
+          <a:xfrm>
+            <a:off x="1410157" y="109195"/>
+            <a:ext cx="9044849" cy="6748805"/>
+          </a:xfrm>
+          <a:prstGeom prst="rect">
+            <a:avLst/>
+          </a:prstGeom>
+        </p:spPr>
+      </p:pic>
+    </p:spTree>
+    <p:extLst>
+      <p:ext uri="{BB962C8B-B14F-4D97-AF65-F5344CB8AC3E}">
+        <p14:creationId xmlns:p14="http://schemas.microsoft.com/office/powerpoint/2010/main" val="918245605"/>
+      </p:ext>
+    </p:extLst>
+  </p:cSld>
+  <p:clrMapOvr>
+    <a:masterClrMapping/>
+  </p:clrMapOvr>
+</p:sld>
+</file>
+
+<file path=ppt/slides/slide5.xml><?xml version="1.0" encoding="utf-8"?>
+<p:sld xmlns:a="http://schemas.openxmlformats.org/drawingml/2006/main" xmlns:r="http://schemas.openxmlformats.org/officeDocument/2006/relationships" xmlns:p="http://schemas.openxmlformats.org/presentationml/2006/main">
+  <p:cSld>
+    <p:spTree>
+      <p:nvGrpSpPr>
+        <p:cNvPr id="1" name=""/>
+        <p:cNvGrpSpPr/>
+        <p:nvPr/>
+      </p:nvGrpSpPr>
+      <p:grpSpPr>
+        <a:xfrm>
+          <a:off x="0" y="0"/>
+          <a:ext cx="0" cy="0"/>
+          <a:chOff x="0" y="0"/>
+          <a:chExt cx="0" cy="0"/>
+        </a:xfrm>
+      </p:grpSpPr>
+      <p:sp>
+        <p:nvSpPr>
+          <p:cNvPr id="8" name="Hình chữ nhật 7">
+            <a:extLst>
+              <a:ext uri="{FF2B5EF4-FFF2-40B4-BE49-F238E27FC236}">
+                <a16:creationId xmlns:a16="http://schemas.microsoft.com/office/drawing/2014/main" id="{9D248E33-3853-4174-A5E1-DE4AA09E282C}"/>
+              </a:ext>
+            </a:extLst>
+          </p:cNvPr>
+          <p:cNvSpPr/>
+          <p:nvPr/>
+        </p:nvSpPr>
+        <p:spPr>
+          <a:xfrm>
+            <a:off x="1500874" y="1948621"/>
+            <a:ext cx="2660728" cy="2622015"/>
+          </a:xfrm>
+          <a:prstGeom prst="rect">
+            <a:avLst/>
+          </a:prstGeom>
+          <a:ln w="19050">
+            <a:solidFill>
+              <a:srgbClr val="FF0000"/>
+            </a:solidFill>
+            <a:prstDash val="lgDash"/>
+          </a:ln>
+        </p:spPr>
+        <p:style>
+          <a:lnRef idx="2">
+            <a:schemeClr val="accent1"/>
+          </a:lnRef>
+          <a:fillRef idx="1">
+            <a:schemeClr val="lt1"/>
+          </a:fillRef>
+          <a:effectRef idx="0">
+            <a:schemeClr val="accent1"/>
+          </a:effectRef>
+          <a:fontRef idx="minor">
+            <a:schemeClr val="dk1"/>
+          </a:fontRef>
+        </p:style>
+        <p:txBody>
+          <a:bodyPr rtlCol="0" anchor="ctr"/>
+          <a:lstStyle/>
+          <a:p>
+            <a:pPr algn="ctr"/>
+            <a:endParaRPr lang="en-US"/>
+          </a:p>
+        </p:txBody>
+      </p:sp>
+      <p:sp>
+        <p:nvSpPr>
+          <p:cNvPr id="19" name="Title 1">
+            <a:extLst>
+              <a:ext uri="{FF2B5EF4-FFF2-40B4-BE49-F238E27FC236}">
+                <a16:creationId xmlns:a16="http://schemas.microsoft.com/office/drawing/2014/main" id="{4CA34646-D273-4CAD-AEEC-3F038480726C}"/>
+              </a:ext>
+            </a:extLst>
+          </p:cNvPr>
+          <p:cNvSpPr>
+            <a:spLocks noGrp="1"/>
+          </p:cNvSpPr>
+          <p:nvPr>
+            <p:ph type="title"/>
+          </p:nvPr>
+        </p:nvSpPr>
+        <p:spPr>
+          <a:xfrm>
+            <a:off x="838200" y="365125"/>
+            <a:ext cx="10515600" cy="1325563"/>
+          </a:xfrm>
+        </p:spPr>
+        <p:txBody>
+          <a:bodyPr/>
+          <a:lstStyle/>
+          <a:p>
+            <a:r>
+              <a:rPr lang="en-US" dirty="0" err="1"/>
+              <a:t>Mô</a:t>
+            </a:r>
+            <a:r>
+              <a:rPr lang="en-US" dirty="0"/>
+              <a:t> </a:t>
+            </a:r>
+            <a:r>
+              <a:rPr lang="en-US" dirty="0" err="1"/>
+              <a:t>hình</a:t>
+            </a:r>
+            <a:r>
+              <a:rPr lang="en-US" dirty="0"/>
+              <a:t> </a:t>
+            </a:r>
+            <a:r>
+              <a:rPr lang="en-US" dirty="0" err="1"/>
+              <a:t>thiết</a:t>
+            </a:r>
+            <a:r>
+              <a:rPr lang="en-US" dirty="0"/>
+              <a:t> </a:t>
+            </a:r>
+            <a:r>
+              <a:rPr lang="en-US" dirty="0" err="1"/>
+              <a:t>kế</a:t>
+            </a:r>
+            <a:r>
+              <a:rPr lang="en-US" dirty="0"/>
+              <a:t>: </a:t>
+            </a:r>
+            <a:r>
+              <a:rPr lang="en-US" dirty="0" err="1"/>
+              <a:t>tổng</a:t>
+            </a:r>
+            <a:r>
+              <a:rPr lang="en-US" dirty="0"/>
+              <a:t> </a:t>
+            </a:r>
+            <a:r>
+              <a:rPr lang="en-US" dirty="0" err="1"/>
+              <a:t>thể</a:t>
+            </a:r>
+            <a:r>
+              <a:rPr lang="en-US" dirty="0"/>
+              <a:t> </a:t>
+            </a:r>
+            <a:r>
+              <a:rPr lang="en-US" dirty="0" err="1"/>
+              <a:t>hệ</a:t>
+            </a:r>
+            <a:r>
+              <a:rPr lang="en-US" dirty="0"/>
+              <a:t> </a:t>
+            </a:r>
+            <a:r>
+              <a:rPr lang="en-US" dirty="0" err="1"/>
+              <a:t>thống</a:t>
+            </a:r>
+            <a:endParaRPr lang="en-US" dirty="0"/>
+          </a:p>
+        </p:txBody>
+      </p:sp>
+      <p:sp>
+        <p:nvSpPr>
+          <p:cNvPr id="20" name="Rounded Rectangle 107">
+            <a:extLst>
+              <a:ext uri="{FF2B5EF4-FFF2-40B4-BE49-F238E27FC236}">
+                <a16:creationId xmlns:a16="http://schemas.microsoft.com/office/drawing/2014/main" id="{E6C34EFB-8698-4C1F-A366-35D33459DBD4}"/>
+              </a:ext>
+            </a:extLst>
+          </p:cNvPr>
+          <p:cNvSpPr/>
+          <p:nvPr/>
+        </p:nvSpPr>
+        <p:spPr>
+          <a:xfrm>
+            <a:off x="2036428" y="2731535"/>
+            <a:ext cx="1798434" cy="881103"/>
+          </a:xfrm>
+          <a:prstGeom prst="roundRect">
+            <a:avLst/>
+          </a:prstGeom>
+          <a:ln w="19050">
+            <a:solidFill>
+              <a:srgbClr val="C00000"/>
+            </a:solidFill>
+          </a:ln>
+        </p:spPr>
+        <p:style>
+          <a:lnRef idx="2">
+            <a:schemeClr val="accent6"/>
+          </a:lnRef>
+          <a:fillRef idx="1">
+            <a:schemeClr val="lt1"/>
+          </a:fillRef>
+          <a:effectRef idx="0">
+            <a:schemeClr val="accent6"/>
+          </a:effectRef>
+          <a:fontRef idx="minor">
+            <a:schemeClr val="dk1"/>
+          </a:fontRef>
+        </p:style>
+        <p:txBody>
+          <a:bodyPr rtlCol="0" anchor="ctr"/>
+          <a:lstStyle>
+            <a:defPPr>
+              <a:defRPr lang="en-US"/>
+            </a:defPPr>
+            <a:lvl1pPr marL="0" algn="l" defTabSz="914400" rtl="0" eaLnBrk="1" latinLnBrk="0" hangingPunct="1">
+              <a:defRPr sz="1800" kern="1200">
+                <a:solidFill>
+                  <a:schemeClr val="dk1"/>
+                </a:solidFill>
+                <a:latin typeface="+mn-lt"/>
+                <a:ea typeface="+mn-ea"/>
+                <a:cs typeface="+mn-cs"/>
+              </a:defRPr>
+            </a:lvl1pPr>
+            <a:lvl2pPr marL="457200" algn="l" defTabSz="914400" rtl="0" eaLnBrk="1" latinLnBrk="0" hangingPunct="1">
+              <a:defRPr sz="1800" kern="1200">
+                <a:solidFill>
+                  <a:schemeClr val="dk1"/>
+                </a:solidFill>
+                <a:latin typeface="+mn-lt"/>
+                <a:ea typeface="+mn-ea"/>
+                <a:cs typeface="+mn-cs"/>
+              </a:defRPr>
+            </a:lvl2pPr>
+            <a:lvl3pPr marL="914400" algn="l" defTabSz="914400" rtl="0" eaLnBrk="1" latinLnBrk="0" hangingPunct="1">
+              <a:defRPr sz="1800" kern="1200">
+                <a:solidFill>
+                  <a:schemeClr val="dk1"/>
+                </a:solidFill>
+                <a:latin typeface="+mn-lt"/>
+                <a:ea typeface="+mn-ea"/>
+                <a:cs typeface="+mn-cs"/>
+              </a:defRPr>
+            </a:lvl3pPr>
+            <a:lvl4pPr marL="1371600" algn="l" defTabSz="914400" rtl="0" eaLnBrk="1" latinLnBrk="0" hangingPunct="1">
+              <a:defRPr sz="1800" kern="1200">
+                <a:solidFill>
+                  <a:schemeClr val="dk1"/>
+                </a:solidFill>
+                <a:latin typeface="+mn-lt"/>
+                <a:ea typeface="+mn-ea"/>
+                <a:cs typeface="+mn-cs"/>
+              </a:defRPr>
+            </a:lvl4pPr>
+            <a:lvl5pPr marL="1828800" algn="l" defTabSz="914400" rtl="0" eaLnBrk="1" latinLnBrk="0" hangingPunct="1">
+              <a:defRPr sz="1800" kern="1200">
+                <a:solidFill>
+                  <a:schemeClr val="dk1"/>
+                </a:solidFill>
+                <a:latin typeface="+mn-lt"/>
+                <a:ea typeface="+mn-ea"/>
+                <a:cs typeface="+mn-cs"/>
+              </a:defRPr>
+            </a:lvl5pPr>
+            <a:lvl6pPr marL="2286000" algn="l" defTabSz="914400" rtl="0" eaLnBrk="1" latinLnBrk="0" hangingPunct="1">
+              <a:defRPr sz="1800" kern="1200">
+                <a:solidFill>
+                  <a:schemeClr val="dk1"/>
+                </a:solidFill>
+                <a:latin typeface="+mn-lt"/>
+                <a:ea typeface="+mn-ea"/>
+                <a:cs typeface="+mn-cs"/>
+              </a:defRPr>
+            </a:lvl6pPr>
+            <a:lvl7pPr marL="2743200" algn="l" defTabSz="914400" rtl="0" eaLnBrk="1" latinLnBrk="0" hangingPunct="1">
+              <a:defRPr sz="1800" kern="1200">
+                <a:solidFill>
+                  <a:schemeClr val="dk1"/>
+                </a:solidFill>
+                <a:latin typeface="+mn-lt"/>
+                <a:ea typeface="+mn-ea"/>
+                <a:cs typeface="+mn-cs"/>
+              </a:defRPr>
+            </a:lvl7pPr>
+            <a:lvl8pPr marL="3200400" algn="l" defTabSz="914400" rtl="0" eaLnBrk="1" latinLnBrk="0" hangingPunct="1">
+              <a:defRPr sz="1800" kern="1200">
+                <a:solidFill>
+                  <a:schemeClr val="dk1"/>
+                </a:solidFill>
+                <a:latin typeface="+mn-lt"/>
+                <a:ea typeface="+mn-ea"/>
+                <a:cs typeface="+mn-cs"/>
+              </a:defRPr>
+            </a:lvl8pPr>
+            <a:lvl9pPr marL="3657600" algn="l" defTabSz="914400" rtl="0" eaLnBrk="1" latinLnBrk="0" hangingPunct="1">
+              <a:defRPr sz="1800" kern="1200">
+                <a:solidFill>
+                  <a:schemeClr val="dk1"/>
+                </a:solidFill>
+                <a:latin typeface="+mn-lt"/>
+                <a:ea typeface="+mn-ea"/>
+                <a:cs typeface="+mn-cs"/>
+              </a:defRPr>
+            </a:lvl9pPr>
+          </a:lstStyle>
+          <a:p>
+            <a:pPr algn="r"/>
+            <a:r>
+              <a:rPr lang="en-US" sz="1600" dirty="0"/>
+              <a:t>AWS S3</a:t>
+            </a:r>
+          </a:p>
+        </p:txBody>
+      </p:sp>
+      <p:sp>
+        <p:nvSpPr>
+          <p:cNvPr id="22" name="Rounded Rectangle 74">
+            <a:extLst>
+              <a:ext uri="{FF2B5EF4-FFF2-40B4-BE49-F238E27FC236}">
+                <a16:creationId xmlns:a16="http://schemas.microsoft.com/office/drawing/2014/main" id="{FFDB2E98-EFF5-43D4-AFEB-E8AB99C7D5B6}"/>
+              </a:ext>
+            </a:extLst>
+          </p:cNvPr>
+          <p:cNvSpPr/>
+          <p:nvPr/>
+        </p:nvSpPr>
+        <p:spPr>
+          <a:xfrm>
+            <a:off x="7613436" y="1948621"/>
+            <a:ext cx="1606575" cy="827569"/>
+          </a:xfrm>
+          <a:prstGeom prst="roundRect">
+            <a:avLst/>
+          </a:prstGeom>
+          <a:ln w="19050">
+            <a:solidFill>
+              <a:srgbClr val="00B0F0"/>
+            </a:solidFill>
+          </a:ln>
+        </p:spPr>
+        <p:style>
+          <a:lnRef idx="2">
+            <a:schemeClr val="accent1"/>
+          </a:lnRef>
+          <a:fillRef idx="1">
+            <a:schemeClr val="lt1"/>
+          </a:fillRef>
+          <a:effectRef idx="0">
+            <a:schemeClr val="accent1"/>
+          </a:effectRef>
+          <a:fontRef idx="minor">
+            <a:schemeClr val="dk1"/>
+          </a:fontRef>
+        </p:style>
+        <p:txBody>
+          <a:bodyPr rtlCol="0" anchor="ctr"/>
+          <a:lstStyle>
+            <a:defPPr>
+              <a:defRPr lang="en-US"/>
+            </a:defPPr>
+            <a:lvl1pPr marL="0" algn="l" defTabSz="914400" rtl="0" eaLnBrk="1" latinLnBrk="0" hangingPunct="1">
+              <a:defRPr sz="1800" kern="1200">
+                <a:solidFill>
+                  <a:schemeClr val="dk1"/>
+                </a:solidFill>
+                <a:latin typeface="+mn-lt"/>
+                <a:ea typeface="+mn-ea"/>
+                <a:cs typeface="+mn-cs"/>
+              </a:defRPr>
+            </a:lvl1pPr>
+            <a:lvl2pPr marL="457200" algn="l" defTabSz="914400" rtl="0" eaLnBrk="1" latinLnBrk="0" hangingPunct="1">
+              <a:defRPr sz="1800" kern="1200">
+                <a:solidFill>
+                  <a:schemeClr val="dk1"/>
+                </a:solidFill>
+                <a:latin typeface="+mn-lt"/>
+                <a:ea typeface="+mn-ea"/>
+                <a:cs typeface="+mn-cs"/>
+              </a:defRPr>
+            </a:lvl2pPr>
+            <a:lvl3pPr marL="914400" algn="l" defTabSz="914400" rtl="0" eaLnBrk="1" latinLnBrk="0" hangingPunct="1">
+              <a:defRPr sz="1800" kern="1200">
+                <a:solidFill>
+                  <a:schemeClr val="dk1"/>
+                </a:solidFill>
+                <a:latin typeface="+mn-lt"/>
+                <a:ea typeface="+mn-ea"/>
+                <a:cs typeface="+mn-cs"/>
+              </a:defRPr>
+            </a:lvl3pPr>
+            <a:lvl4pPr marL="1371600" algn="l" defTabSz="914400" rtl="0" eaLnBrk="1" latinLnBrk="0" hangingPunct="1">
+              <a:defRPr sz="1800" kern="1200">
+                <a:solidFill>
+                  <a:schemeClr val="dk1"/>
+                </a:solidFill>
+                <a:latin typeface="+mn-lt"/>
+                <a:ea typeface="+mn-ea"/>
+                <a:cs typeface="+mn-cs"/>
+              </a:defRPr>
+            </a:lvl4pPr>
+            <a:lvl5pPr marL="1828800" algn="l" defTabSz="914400" rtl="0" eaLnBrk="1" latinLnBrk="0" hangingPunct="1">
+              <a:defRPr sz="1800" kern="1200">
+                <a:solidFill>
+                  <a:schemeClr val="dk1"/>
+                </a:solidFill>
+                <a:latin typeface="+mn-lt"/>
+                <a:ea typeface="+mn-ea"/>
+                <a:cs typeface="+mn-cs"/>
+              </a:defRPr>
+            </a:lvl5pPr>
+            <a:lvl6pPr marL="2286000" algn="l" defTabSz="914400" rtl="0" eaLnBrk="1" latinLnBrk="0" hangingPunct="1">
+              <a:defRPr sz="1800" kern="1200">
+                <a:solidFill>
+                  <a:schemeClr val="dk1"/>
+                </a:solidFill>
+                <a:latin typeface="+mn-lt"/>
+                <a:ea typeface="+mn-ea"/>
+                <a:cs typeface="+mn-cs"/>
+              </a:defRPr>
+            </a:lvl6pPr>
+            <a:lvl7pPr marL="2743200" algn="l" defTabSz="914400" rtl="0" eaLnBrk="1" latinLnBrk="0" hangingPunct="1">
+              <a:defRPr sz="1800" kern="1200">
+                <a:solidFill>
+                  <a:schemeClr val="dk1"/>
+                </a:solidFill>
+                <a:latin typeface="+mn-lt"/>
+                <a:ea typeface="+mn-ea"/>
+                <a:cs typeface="+mn-cs"/>
+              </a:defRPr>
+            </a:lvl7pPr>
+            <a:lvl8pPr marL="3200400" algn="l" defTabSz="914400" rtl="0" eaLnBrk="1" latinLnBrk="0" hangingPunct="1">
+              <a:defRPr sz="1800" kern="1200">
+                <a:solidFill>
+                  <a:schemeClr val="dk1"/>
+                </a:solidFill>
+                <a:latin typeface="+mn-lt"/>
+                <a:ea typeface="+mn-ea"/>
+                <a:cs typeface="+mn-cs"/>
+              </a:defRPr>
+            </a:lvl8pPr>
+            <a:lvl9pPr marL="3657600" algn="l" defTabSz="914400" rtl="0" eaLnBrk="1" latinLnBrk="0" hangingPunct="1">
+              <a:defRPr sz="1800" kern="1200">
+                <a:solidFill>
+                  <a:schemeClr val="dk1"/>
+                </a:solidFill>
+                <a:latin typeface="+mn-lt"/>
+                <a:ea typeface="+mn-ea"/>
+                <a:cs typeface="+mn-cs"/>
+              </a:defRPr>
+            </a:lvl9pPr>
+          </a:lstStyle>
+          <a:p>
+            <a:pPr algn="r"/>
+            <a:r>
+              <a:rPr lang="en-US" sz="1600" dirty="0"/>
+              <a:t>Alexa</a:t>
+            </a:r>
+          </a:p>
+        </p:txBody>
+      </p:sp>
+      <p:sp>
+        <p:nvSpPr>
+          <p:cNvPr id="23" name="Rounded Rectangle 63">
+            <a:extLst>
+              <a:ext uri="{FF2B5EF4-FFF2-40B4-BE49-F238E27FC236}">
+                <a16:creationId xmlns:a16="http://schemas.microsoft.com/office/drawing/2014/main" id="{12CF0B05-5E85-4B6B-876F-4EDB77D5315F}"/>
+              </a:ext>
+            </a:extLst>
+          </p:cNvPr>
+          <p:cNvSpPr/>
+          <p:nvPr/>
+        </p:nvSpPr>
+        <p:spPr>
+          <a:xfrm>
+            <a:off x="5425445" y="3693135"/>
+            <a:ext cx="1870763" cy="727494"/>
+          </a:xfrm>
+          <a:prstGeom prst="roundRect">
+            <a:avLst/>
+          </a:prstGeom>
+          <a:ln w="19050"/>
+        </p:spPr>
+        <p:style>
+          <a:lnRef idx="2">
+            <a:schemeClr val="accent2"/>
+          </a:lnRef>
+          <a:fillRef idx="1">
+            <a:schemeClr val="lt1"/>
+          </a:fillRef>
+          <a:effectRef idx="0">
+            <a:schemeClr val="accent2"/>
+          </a:effectRef>
+          <a:fontRef idx="minor">
+            <a:schemeClr val="dk1"/>
+          </a:fontRef>
+        </p:style>
+        <p:txBody>
+          <a:bodyPr rtlCol="0" anchor="ctr"/>
+          <a:lstStyle>
+            <a:defPPr>
+              <a:defRPr lang="en-US"/>
+            </a:defPPr>
+            <a:lvl1pPr marL="0" algn="l" defTabSz="914400" rtl="0" eaLnBrk="1" latinLnBrk="0" hangingPunct="1">
+              <a:defRPr sz="1800" kern="1200">
+                <a:solidFill>
+                  <a:schemeClr val="dk1"/>
+                </a:solidFill>
+                <a:latin typeface="+mn-lt"/>
+                <a:ea typeface="+mn-ea"/>
+                <a:cs typeface="+mn-cs"/>
+              </a:defRPr>
+            </a:lvl1pPr>
+            <a:lvl2pPr marL="457200" algn="l" defTabSz="914400" rtl="0" eaLnBrk="1" latinLnBrk="0" hangingPunct="1">
+              <a:defRPr sz="1800" kern="1200">
+                <a:solidFill>
+                  <a:schemeClr val="dk1"/>
+                </a:solidFill>
+                <a:latin typeface="+mn-lt"/>
+                <a:ea typeface="+mn-ea"/>
+                <a:cs typeface="+mn-cs"/>
+              </a:defRPr>
+            </a:lvl2pPr>
+            <a:lvl3pPr marL="914400" algn="l" defTabSz="914400" rtl="0" eaLnBrk="1" latinLnBrk="0" hangingPunct="1">
+              <a:defRPr sz="1800" kern="1200">
+                <a:solidFill>
+                  <a:schemeClr val="dk1"/>
+                </a:solidFill>
+                <a:latin typeface="+mn-lt"/>
+                <a:ea typeface="+mn-ea"/>
+                <a:cs typeface="+mn-cs"/>
+              </a:defRPr>
+            </a:lvl3pPr>
+            <a:lvl4pPr marL="1371600" algn="l" defTabSz="914400" rtl="0" eaLnBrk="1" latinLnBrk="0" hangingPunct="1">
+              <a:defRPr sz="1800" kern="1200">
+                <a:solidFill>
+                  <a:schemeClr val="dk1"/>
+                </a:solidFill>
+                <a:latin typeface="+mn-lt"/>
+                <a:ea typeface="+mn-ea"/>
+                <a:cs typeface="+mn-cs"/>
+              </a:defRPr>
+            </a:lvl4pPr>
+            <a:lvl5pPr marL="1828800" algn="l" defTabSz="914400" rtl="0" eaLnBrk="1" latinLnBrk="0" hangingPunct="1">
+              <a:defRPr sz="1800" kern="1200">
+                <a:solidFill>
+                  <a:schemeClr val="dk1"/>
+                </a:solidFill>
+                <a:latin typeface="+mn-lt"/>
+                <a:ea typeface="+mn-ea"/>
+                <a:cs typeface="+mn-cs"/>
+              </a:defRPr>
+            </a:lvl5pPr>
+            <a:lvl6pPr marL="2286000" algn="l" defTabSz="914400" rtl="0" eaLnBrk="1" latinLnBrk="0" hangingPunct="1">
+              <a:defRPr sz="1800" kern="1200">
+                <a:solidFill>
+                  <a:schemeClr val="dk1"/>
+                </a:solidFill>
+                <a:latin typeface="+mn-lt"/>
+                <a:ea typeface="+mn-ea"/>
+                <a:cs typeface="+mn-cs"/>
+              </a:defRPr>
+            </a:lvl6pPr>
+            <a:lvl7pPr marL="2743200" algn="l" defTabSz="914400" rtl="0" eaLnBrk="1" latinLnBrk="0" hangingPunct="1">
+              <a:defRPr sz="1800" kern="1200">
+                <a:solidFill>
+                  <a:schemeClr val="dk1"/>
+                </a:solidFill>
+                <a:latin typeface="+mn-lt"/>
+                <a:ea typeface="+mn-ea"/>
+                <a:cs typeface="+mn-cs"/>
+              </a:defRPr>
+            </a:lvl7pPr>
+            <a:lvl8pPr marL="3200400" algn="l" defTabSz="914400" rtl="0" eaLnBrk="1" latinLnBrk="0" hangingPunct="1">
+              <a:defRPr sz="1800" kern="1200">
+                <a:solidFill>
+                  <a:schemeClr val="dk1"/>
+                </a:solidFill>
+                <a:latin typeface="+mn-lt"/>
+                <a:ea typeface="+mn-ea"/>
+                <a:cs typeface="+mn-cs"/>
+              </a:defRPr>
+            </a:lvl8pPr>
+            <a:lvl9pPr marL="3657600" algn="l" defTabSz="914400" rtl="0" eaLnBrk="1" latinLnBrk="0" hangingPunct="1">
+              <a:defRPr sz="1800" kern="1200">
+                <a:solidFill>
+                  <a:schemeClr val="dk1"/>
+                </a:solidFill>
+                <a:latin typeface="+mn-lt"/>
+                <a:ea typeface="+mn-ea"/>
+                <a:cs typeface="+mn-cs"/>
+              </a:defRPr>
+            </a:lvl9pPr>
+          </a:lstStyle>
+          <a:p>
+            <a:pPr algn="r"/>
+            <a:r>
+              <a:rPr lang="en-US" sz="1600" dirty="0"/>
+              <a:t>AWS Lambda</a:t>
+            </a:r>
+          </a:p>
+        </p:txBody>
+      </p:sp>
+      <p:pic>
+        <p:nvPicPr>
+          <p:cNvPr id="25" name="Picture 6" descr="Káº¿t quáº£ hÃ¬nh áº£nh cho aws lambda">
+            <a:extLst>
+              <a:ext uri="{FF2B5EF4-FFF2-40B4-BE49-F238E27FC236}">
+                <a16:creationId xmlns:a16="http://schemas.microsoft.com/office/drawing/2014/main" id="{B7B4313E-E64B-40BE-91D3-DA0FFF6C782C}"/>
+              </a:ext>
+            </a:extLst>
+          </p:cNvPr>
+          <p:cNvPicPr>
+            <a:picLocks noChangeAspect="1" noChangeArrowheads="1"/>
+          </p:cNvPicPr>
+          <p:nvPr/>
+        </p:nvPicPr>
+        <p:blipFill>
+          <a:blip r:embed="rId3">
+            <a:extLst>
+              <a:ext uri="{28A0092B-C50C-407E-A947-70E740481C1C}">
+                <a14:useLocalDpi xmlns:a14="http://schemas.microsoft.com/office/drawing/2010/main" val="0"/>
+              </a:ext>
+            </a:extLst>
+          </a:blip>
+          <a:srcRect/>
+          <a:stretch>
+            <a:fillRect/>
+          </a:stretch>
+        </p:blipFill>
+        <p:spPr bwMode="auto">
+          <a:xfrm>
+            <a:off x="5577731" y="3827229"/>
+            <a:ext cx="443996" cy="459306"/>
+          </a:xfrm>
+          <a:prstGeom prst="rect">
+            <a:avLst/>
+          </a:prstGeom>
+          <a:noFill/>
+          <a:extLst>
+            <a:ext uri="{909E8E84-426E-40DD-AFC4-6F175D3DCCD1}">
+              <a14:hiddenFill xmlns:a14="http://schemas.microsoft.com/office/drawing/2010/main">
+                <a:solidFill>
+                  <a:srgbClr val="FFFFFF"/>
+                </a:solidFill>
+              </a14:hiddenFill>
+            </a:ext>
+          </a:extLst>
+        </p:spPr>
+      </p:pic>
+      <p:pic>
+        <p:nvPicPr>
+          <p:cNvPr id="26" name="Picture 2" descr="Káº¿t quáº£ hÃ¬nh áº£nh cho alexa icon aws">
+            <a:extLst>
+              <a:ext uri="{FF2B5EF4-FFF2-40B4-BE49-F238E27FC236}">
+                <a16:creationId xmlns:a16="http://schemas.microsoft.com/office/drawing/2014/main" id="{AE517E7F-D25E-493E-AB4C-B95B4D9BF0A9}"/>
+              </a:ext>
+            </a:extLst>
+          </p:cNvPr>
+          <p:cNvPicPr>
+            <a:picLocks noChangeAspect="1" noChangeArrowheads="1"/>
+          </p:cNvPicPr>
+          <p:nvPr/>
+        </p:nvPicPr>
+        <p:blipFill>
+          <a:blip r:embed="rId4">
+            <a:extLst>
+              <a:ext uri="{28A0092B-C50C-407E-A947-70E740481C1C}">
+                <a14:useLocalDpi xmlns:a14="http://schemas.microsoft.com/office/drawing/2010/main" val="0"/>
+              </a:ext>
+            </a:extLst>
+          </a:blip>
+          <a:srcRect/>
+          <a:stretch>
+            <a:fillRect/>
+          </a:stretch>
+        </p:blipFill>
+        <p:spPr bwMode="auto">
+          <a:xfrm>
+            <a:off x="7613436" y="1861853"/>
+            <a:ext cx="1009414" cy="1009414"/>
+          </a:xfrm>
+          <a:prstGeom prst="rect">
+            <a:avLst/>
+          </a:prstGeom>
+          <a:noFill/>
+          <a:extLst>
+            <a:ext uri="{909E8E84-426E-40DD-AFC4-6F175D3DCCD1}">
+              <a14:hiddenFill xmlns:a14="http://schemas.microsoft.com/office/drawing/2010/main">
+                <a:solidFill>
+                  <a:srgbClr val="FFFFFF"/>
+                </a:solidFill>
+              </a14:hiddenFill>
+            </a:ext>
+          </a:extLst>
+        </p:spPr>
+      </p:pic>
+      <p:cxnSp>
+        <p:nvCxnSpPr>
+          <p:cNvPr id="27" name="Curved Connector 102">
+            <a:extLst>
+              <a:ext uri="{FF2B5EF4-FFF2-40B4-BE49-F238E27FC236}">
+                <a16:creationId xmlns:a16="http://schemas.microsoft.com/office/drawing/2014/main" id="{837DCC6D-0819-40D1-99C6-5F077B213BF0}"/>
+              </a:ext>
+            </a:extLst>
+          </p:cNvPr>
+          <p:cNvCxnSpPr>
+            <a:cxnSpLocks/>
+            <a:stCxn id="26" idx="1"/>
+            <a:endCxn id="23" idx="0"/>
+          </p:cNvCxnSpPr>
+          <p:nvPr/>
+        </p:nvCxnSpPr>
+        <p:spPr>
+          <a:xfrm rot="10800000" flipV="1">
+            <a:off x="6360828" y="2366559"/>
+            <a:ext cx="1252609" cy="1326575"/>
+          </a:xfrm>
+          <a:prstGeom prst="curvedConnector2">
+            <a:avLst/>
+          </a:prstGeom>
+          <a:ln>
+            <a:solidFill>
+              <a:srgbClr val="00B0F0"/>
+            </a:solidFill>
+            <a:headEnd type="none" w="med" len="med"/>
+            <a:tailEnd type="arrow" w="med" len="med"/>
+          </a:ln>
+        </p:spPr>
+        <p:style>
+          <a:lnRef idx="3">
+            <a:schemeClr val="accent6"/>
+          </a:lnRef>
+          <a:fillRef idx="0">
+            <a:schemeClr val="accent6"/>
+          </a:fillRef>
+          <a:effectRef idx="2">
+            <a:schemeClr val="accent6"/>
+          </a:effectRef>
+          <a:fontRef idx="minor">
+            <a:schemeClr val="tx1"/>
+          </a:fontRef>
+        </p:style>
+      </p:cxnSp>
+      <p:sp>
+        <p:nvSpPr>
+          <p:cNvPr id="28" name="TextBox 45">
+            <a:extLst>
+              <a:ext uri="{FF2B5EF4-FFF2-40B4-BE49-F238E27FC236}">
+                <a16:creationId xmlns:a16="http://schemas.microsoft.com/office/drawing/2014/main" id="{A2025E43-CA86-4E41-9B67-9EB6C4860839}"/>
+              </a:ext>
+            </a:extLst>
+          </p:cNvPr>
+          <p:cNvSpPr txBox="1"/>
+          <p:nvPr/>
+        </p:nvSpPr>
+        <p:spPr>
+          <a:xfrm>
+            <a:off x="4933816" y="2691292"/>
+            <a:ext cx="1725152" cy="338554"/>
+          </a:xfrm>
+          <a:prstGeom prst="rect">
+            <a:avLst/>
+          </a:prstGeom>
+          <a:noFill/>
+          <a:ln w="12700">
+            <a:noFill/>
+          </a:ln>
+        </p:spPr>
+        <p:txBody>
+          <a:bodyPr wrap="none" rtlCol="0" anchor="ctr">
+            <a:spAutoFit/>
+          </a:bodyPr>
+          <a:lstStyle>
+            <a:defPPr>
+              <a:defRPr lang="en-US"/>
+            </a:defPPr>
+            <a:lvl1pPr marL="0" algn="l" defTabSz="914400" rtl="0" eaLnBrk="1" latinLnBrk="0" hangingPunct="1">
+              <a:defRPr sz="1800" kern="1200">
+                <a:solidFill>
+                  <a:schemeClr val="tx1"/>
+                </a:solidFill>
+                <a:latin typeface="+mn-lt"/>
+                <a:ea typeface="+mn-ea"/>
+                <a:cs typeface="+mn-cs"/>
+              </a:defRPr>
+            </a:lvl1pPr>
+            <a:lvl2pPr marL="457200" algn="l" defTabSz="914400" rtl="0" eaLnBrk="1" latinLnBrk="0" hangingPunct="1">
+              <a:defRPr sz="1800" kern="1200">
+                <a:solidFill>
+                  <a:schemeClr val="tx1"/>
+                </a:solidFill>
+                <a:latin typeface="+mn-lt"/>
+                <a:ea typeface="+mn-ea"/>
+                <a:cs typeface="+mn-cs"/>
+              </a:defRPr>
+            </a:lvl2pPr>
+            <a:lvl3pPr marL="914400" algn="l" defTabSz="914400" rtl="0" eaLnBrk="1" latinLnBrk="0" hangingPunct="1">
+              <a:defRPr sz="1800" kern="1200">
+                <a:solidFill>
+                  <a:schemeClr val="tx1"/>
+                </a:solidFill>
+                <a:latin typeface="+mn-lt"/>
+                <a:ea typeface="+mn-ea"/>
+                <a:cs typeface="+mn-cs"/>
+              </a:defRPr>
+            </a:lvl3pPr>
+            <a:lvl4pPr marL="1371600" algn="l" defTabSz="914400" rtl="0" eaLnBrk="1" latinLnBrk="0" hangingPunct="1">
+              <a:defRPr sz="1800" kern="1200">
+                <a:solidFill>
+                  <a:schemeClr val="tx1"/>
+                </a:solidFill>
+                <a:latin typeface="+mn-lt"/>
+                <a:ea typeface="+mn-ea"/>
+                <a:cs typeface="+mn-cs"/>
+              </a:defRPr>
+            </a:lvl4pPr>
+            <a:lvl5pPr marL="1828800" algn="l" defTabSz="914400" rtl="0" eaLnBrk="1" latinLnBrk="0" hangingPunct="1">
+              <a:defRPr sz="1800" kern="1200">
+                <a:solidFill>
+                  <a:schemeClr val="tx1"/>
+                </a:solidFill>
+                <a:latin typeface="+mn-lt"/>
+                <a:ea typeface="+mn-ea"/>
+                <a:cs typeface="+mn-cs"/>
+              </a:defRPr>
+            </a:lvl5pPr>
+            <a:lvl6pPr marL="2286000" algn="l" defTabSz="914400" rtl="0" eaLnBrk="1" latinLnBrk="0" hangingPunct="1">
+              <a:defRPr sz="1800" kern="1200">
+                <a:solidFill>
+                  <a:schemeClr val="tx1"/>
+                </a:solidFill>
+                <a:latin typeface="+mn-lt"/>
+                <a:ea typeface="+mn-ea"/>
+                <a:cs typeface="+mn-cs"/>
+              </a:defRPr>
+            </a:lvl6pPr>
+            <a:lvl7pPr marL="2743200" algn="l" defTabSz="914400" rtl="0" eaLnBrk="1" latinLnBrk="0" hangingPunct="1">
+              <a:defRPr sz="1800" kern="1200">
+                <a:solidFill>
+                  <a:schemeClr val="tx1"/>
+                </a:solidFill>
+                <a:latin typeface="+mn-lt"/>
+                <a:ea typeface="+mn-ea"/>
+                <a:cs typeface="+mn-cs"/>
+              </a:defRPr>
+            </a:lvl7pPr>
+            <a:lvl8pPr marL="3200400" algn="l" defTabSz="914400" rtl="0" eaLnBrk="1" latinLnBrk="0" hangingPunct="1">
+              <a:defRPr sz="1800" kern="1200">
+                <a:solidFill>
+                  <a:schemeClr val="tx1"/>
+                </a:solidFill>
+                <a:latin typeface="+mn-lt"/>
+                <a:ea typeface="+mn-ea"/>
+                <a:cs typeface="+mn-cs"/>
+              </a:defRPr>
+            </a:lvl8pPr>
+            <a:lvl9pPr marL="3657600" algn="l" defTabSz="914400" rtl="0" eaLnBrk="1" latinLnBrk="0" hangingPunct="1">
+              <a:defRPr sz="1800" kern="1200">
+                <a:solidFill>
+                  <a:schemeClr val="tx1"/>
+                </a:solidFill>
+                <a:latin typeface="+mn-lt"/>
+                <a:ea typeface="+mn-ea"/>
+                <a:cs typeface="+mn-cs"/>
+              </a:defRPr>
+            </a:lvl9pPr>
+          </a:lstStyle>
+          <a:p>
+            <a:r>
+              <a:rPr lang="en-US" sz="1600" dirty="0"/>
+              <a:t>Ra </a:t>
+            </a:r>
+            <a:r>
+              <a:rPr lang="en-US" sz="1600" dirty="0" err="1"/>
+              <a:t>lệnh</a:t>
+            </a:r>
+            <a:r>
+              <a:rPr lang="en-US" sz="1600" dirty="0"/>
+              <a:t> </a:t>
+            </a:r>
+            <a:r>
+              <a:rPr lang="en-US" sz="1600" dirty="0" err="1"/>
+              <a:t>điều</a:t>
+            </a:r>
+            <a:r>
+              <a:rPr lang="en-US" sz="1600" dirty="0"/>
+              <a:t> </a:t>
+            </a:r>
+            <a:r>
+              <a:rPr lang="en-US" sz="1600" dirty="0" err="1"/>
+              <a:t>khiển</a:t>
+            </a:r>
+            <a:endParaRPr lang="en-US" sz="1600" dirty="0"/>
+          </a:p>
+        </p:txBody>
+      </p:sp>
+      <p:cxnSp>
+        <p:nvCxnSpPr>
+          <p:cNvPr id="29" name="Curved Connector 102">
+            <a:extLst>
+              <a:ext uri="{FF2B5EF4-FFF2-40B4-BE49-F238E27FC236}">
+                <a16:creationId xmlns:a16="http://schemas.microsoft.com/office/drawing/2014/main" id="{7B070044-0D4A-4CF7-A1A4-AADCDE58146D}"/>
+              </a:ext>
+            </a:extLst>
+          </p:cNvPr>
+          <p:cNvCxnSpPr>
+            <a:cxnSpLocks/>
+            <a:stCxn id="23" idx="1"/>
+            <a:endCxn id="20" idx="2"/>
+          </p:cNvCxnSpPr>
+          <p:nvPr/>
+        </p:nvCxnSpPr>
+        <p:spPr>
+          <a:xfrm rot="10800000">
+            <a:off x="2935645" y="3612638"/>
+            <a:ext cx="2489800" cy="444244"/>
+          </a:xfrm>
+          <a:prstGeom prst="curvedConnector2">
+            <a:avLst/>
+          </a:prstGeom>
+          <a:ln>
+            <a:solidFill>
+              <a:schemeClr val="accent2"/>
+            </a:solidFill>
+            <a:headEnd type="none" w="med" len="med"/>
+            <a:tailEnd type="arrow" w="med" len="med"/>
+          </a:ln>
+        </p:spPr>
+        <p:style>
+          <a:lnRef idx="3">
+            <a:schemeClr val="accent6"/>
+          </a:lnRef>
+          <a:fillRef idx="0">
+            <a:schemeClr val="accent6"/>
+          </a:fillRef>
+          <a:effectRef idx="2">
+            <a:schemeClr val="accent6"/>
+          </a:effectRef>
+          <a:fontRef idx="minor">
+            <a:schemeClr val="tx1"/>
+          </a:fontRef>
+        </p:style>
+      </p:cxnSp>
+      <p:sp>
+        <p:nvSpPr>
+          <p:cNvPr id="31" name="TextBox 45">
+            <a:extLst>
+              <a:ext uri="{FF2B5EF4-FFF2-40B4-BE49-F238E27FC236}">
+                <a16:creationId xmlns:a16="http://schemas.microsoft.com/office/drawing/2014/main" id="{7CAF63C7-FE09-4946-BF7F-F0217913F822}"/>
+              </a:ext>
+            </a:extLst>
+          </p:cNvPr>
+          <p:cNvSpPr txBox="1"/>
+          <p:nvPr/>
+        </p:nvSpPr>
+        <p:spPr>
+          <a:xfrm>
+            <a:off x="3334333" y="4026153"/>
+            <a:ext cx="1633262" cy="338554"/>
+          </a:xfrm>
+          <a:prstGeom prst="rect">
+            <a:avLst/>
+          </a:prstGeom>
+          <a:noFill/>
+          <a:ln w="12700">
+            <a:noFill/>
+          </a:ln>
+        </p:spPr>
+        <p:txBody>
+          <a:bodyPr wrap="square" rtlCol="0" anchor="ctr">
+            <a:spAutoFit/>
+          </a:bodyPr>
+          <a:lstStyle>
+            <a:defPPr>
+              <a:defRPr lang="en-US"/>
+            </a:defPPr>
+            <a:lvl1pPr marL="0" algn="l" defTabSz="914400" rtl="0" eaLnBrk="1" latinLnBrk="0" hangingPunct="1">
+              <a:defRPr sz="1800" kern="1200">
+                <a:solidFill>
+                  <a:schemeClr val="tx1"/>
+                </a:solidFill>
+                <a:latin typeface="+mn-lt"/>
+                <a:ea typeface="+mn-ea"/>
+                <a:cs typeface="+mn-cs"/>
+              </a:defRPr>
+            </a:lvl1pPr>
+            <a:lvl2pPr marL="457200" algn="l" defTabSz="914400" rtl="0" eaLnBrk="1" latinLnBrk="0" hangingPunct="1">
+              <a:defRPr sz="1800" kern="1200">
+                <a:solidFill>
+                  <a:schemeClr val="tx1"/>
+                </a:solidFill>
+                <a:latin typeface="+mn-lt"/>
+                <a:ea typeface="+mn-ea"/>
+                <a:cs typeface="+mn-cs"/>
+              </a:defRPr>
+            </a:lvl2pPr>
+            <a:lvl3pPr marL="914400" algn="l" defTabSz="914400" rtl="0" eaLnBrk="1" latinLnBrk="0" hangingPunct="1">
+              <a:defRPr sz="1800" kern="1200">
+                <a:solidFill>
+                  <a:schemeClr val="tx1"/>
+                </a:solidFill>
+                <a:latin typeface="+mn-lt"/>
+                <a:ea typeface="+mn-ea"/>
+                <a:cs typeface="+mn-cs"/>
+              </a:defRPr>
+            </a:lvl3pPr>
+            <a:lvl4pPr marL="1371600" algn="l" defTabSz="914400" rtl="0" eaLnBrk="1" latinLnBrk="0" hangingPunct="1">
+              <a:defRPr sz="1800" kern="1200">
+                <a:solidFill>
+                  <a:schemeClr val="tx1"/>
+                </a:solidFill>
+                <a:latin typeface="+mn-lt"/>
+                <a:ea typeface="+mn-ea"/>
+                <a:cs typeface="+mn-cs"/>
+              </a:defRPr>
+            </a:lvl4pPr>
+            <a:lvl5pPr marL="1828800" algn="l" defTabSz="914400" rtl="0" eaLnBrk="1" latinLnBrk="0" hangingPunct="1">
+              <a:defRPr sz="1800" kern="1200">
+                <a:solidFill>
+                  <a:schemeClr val="tx1"/>
+                </a:solidFill>
+                <a:latin typeface="+mn-lt"/>
+                <a:ea typeface="+mn-ea"/>
+                <a:cs typeface="+mn-cs"/>
+              </a:defRPr>
+            </a:lvl5pPr>
+            <a:lvl6pPr marL="2286000" algn="l" defTabSz="914400" rtl="0" eaLnBrk="1" latinLnBrk="0" hangingPunct="1">
+              <a:defRPr sz="1800" kern="1200">
+                <a:solidFill>
+                  <a:schemeClr val="tx1"/>
+                </a:solidFill>
+                <a:latin typeface="+mn-lt"/>
+                <a:ea typeface="+mn-ea"/>
+                <a:cs typeface="+mn-cs"/>
+              </a:defRPr>
+            </a:lvl6pPr>
+            <a:lvl7pPr marL="2743200" algn="l" defTabSz="914400" rtl="0" eaLnBrk="1" latinLnBrk="0" hangingPunct="1">
+              <a:defRPr sz="1800" kern="1200">
+                <a:solidFill>
+                  <a:schemeClr val="tx1"/>
+                </a:solidFill>
+                <a:latin typeface="+mn-lt"/>
+                <a:ea typeface="+mn-ea"/>
+                <a:cs typeface="+mn-cs"/>
+              </a:defRPr>
+            </a:lvl7pPr>
+            <a:lvl8pPr marL="3200400" algn="l" defTabSz="914400" rtl="0" eaLnBrk="1" latinLnBrk="0" hangingPunct="1">
+              <a:defRPr sz="1800" kern="1200">
+                <a:solidFill>
+                  <a:schemeClr val="tx1"/>
+                </a:solidFill>
+                <a:latin typeface="+mn-lt"/>
+                <a:ea typeface="+mn-ea"/>
+                <a:cs typeface="+mn-cs"/>
+              </a:defRPr>
+            </a:lvl8pPr>
+            <a:lvl9pPr marL="3657600" algn="l" defTabSz="914400" rtl="0" eaLnBrk="1" latinLnBrk="0" hangingPunct="1">
+              <a:defRPr sz="1800" kern="1200">
+                <a:solidFill>
+                  <a:schemeClr val="tx1"/>
+                </a:solidFill>
+                <a:latin typeface="+mn-lt"/>
+                <a:ea typeface="+mn-ea"/>
+                <a:cs typeface="+mn-cs"/>
+              </a:defRPr>
+            </a:lvl9pPr>
+          </a:lstStyle>
+          <a:p>
+            <a:pPr algn="ctr"/>
+            <a:r>
+              <a:rPr lang="en-US" sz="1600" dirty="0"/>
+              <a:t>Request file</a:t>
+            </a:r>
+          </a:p>
+        </p:txBody>
+      </p:sp>
+      <p:pic>
+        <p:nvPicPr>
+          <p:cNvPr id="32" name="Picture 4" descr="Káº¿t quáº£ hÃ¬nh áº£nh cho S3 icon">
+            <a:extLst>
+              <a:ext uri="{FF2B5EF4-FFF2-40B4-BE49-F238E27FC236}">
+                <a16:creationId xmlns:a16="http://schemas.microsoft.com/office/drawing/2014/main" id="{49E19330-41C2-44B5-8642-B931FFFB752D}"/>
+              </a:ext>
+            </a:extLst>
+          </p:cNvPr>
+          <p:cNvPicPr>
+            <a:picLocks noChangeAspect="1" noChangeArrowheads="1"/>
+          </p:cNvPicPr>
+          <p:nvPr/>
+        </p:nvPicPr>
+        <p:blipFill>
+          <a:blip r:embed="rId5">
+            <a:extLst>
+              <a:ext uri="{28A0092B-C50C-407E-A947-70E740481C1C}">
+                <a14:useLocalDpi xmlns:a14="http://schemas.microsoft.com/office/drawing/2010/main" val="0"/>
+              </a:ext>
+            </a:extLst>
+          </a:blip>
+          <a:srcRect/>
+          <a:stretch>
+            <a:fillRect/>
+          </a:stretch>
+        </p:blipFill>
+        <p:spPr bwMode="auto">
+          <a:xfrm>
+            <a:off x="2049667" y="2731534"/>
+            <a:ext cx="885976" cy="885976"/>
+          </a:xfrm>
+          <a:prstGeom prst="rect">
+            <a:avLst/>
+          </a:prstGeom>
+          <a:noFill/>
+          <a:extLst>
+            <a:ext uri="{909E8E84-426E-40DD-AFC4-6F175D3DCCD1}">
+              <a14:hiddenFill xmlns:a14="http://schemas.microsoft.com/office/drawing/2010/main">
+                <a:solidFill>
+                  <a:srgbClr val="FFFFFF"/>
+                </a:solidFill>
+              </a14:hiddenFill>
+            </a:ext>
+          </a:extLst>
+        </p:spPr>
+      </p:pic>
+      <p:cxnSp>
+        <p:nvCxnSpPr>
+          <p:cNvPr id="33" name="Curved Connector 102">
+            <a:extLst>
+              <a:ext uri="{FF2B5EF4-FFF2-40B4-BE49-F238E27FC236}">
+                <a16:creationId xmlns:a16="http://schemas.microsoft.com/office/drawing/2014/main" id="{FE36307B-3FBC-4745-A8DD-E9ADBEE59438}"/>
+              </a:ext>
+            </a:extLst>
+          </p:cNvPr>
+          <p:cNvCxnSpPr>
+            <a:cxnSpLocks/>
+            <a:stCxn id="23" idx="3"/>
+            <a:endCxn id="22" idx="2"/>
+          </p:cNvCxnSpPr>
+          <p:nvPr/>
+        </p:nvCxnSpPr>
+        <p:spPr>
+          <a:xfrm flipV="1">
+            <a:off x="7296208" y="2776190"/>
+            <a:ext cx="1120516" cy="1280692"/>
+          </a:xfrm>
+          <a:prstGeom prst="curvedConnector2">
+            <a:avLst/>
+          </a:prstGeom>
+          <a:ln>
+            <a:solidFill>
+              <a:schemeClr val="accent2"/>
+            </a:solidFill>
+            <a:headEnd type="none" w="med" len="med"/>
+            <a:tailEnd type="arrow" w="med" len="med"/>
+          </a:ln>
+        </p:spPr>
+        <p:style>
+          <a:lnRef idx="3">
+            <a:schemeClr val="accent6"/>
+          </a:lnRef>
+          <a:fillRef idx="0">
+            <a:schemeClr val="accent6"/>
+          </a:fillRef>
+          <a:effectRef idx="2">
+            <a:schemeClr val="accent6"/>
+          </a:effectRef>
+          <a:fontRef idx="minor">
+            <a:schemeClr val="tx1"/>
+          </a:fontRef>
+        </p:style>
+      </p:cxnSp>
+      <p:sp>
+        <p:nvSpPr>
+          <p:cNvPr id="34" name="TextBox 45">
+            <a:extLst>
+              <a:ext uri="{FF2B5EF4-FFF2-40B4-BE49-F238E27FC236}">
+                <a16:creationId xmlns:a16="http://schemas.microsoft.com/office/drawing/2014/main" id="{6D745B99-D826-4497-A676-93F015395EA9}"/>
+              </a:ext>
+            </a:extLst>
+          </p:cNvPr>
+          <p:cNvSpPr txBox="1"/>
+          <p:nvPr/>
+        </p:nvSpPr>
+        <p:spPr>
+          <a:xfrm>
+            <a:off x="8124875" y="3463822"/>
+            <a:ext cx="1430200" cy="338554"/>
+          </a:xfrm>
+          <a:prstGeom prst="rect">
+            <a:avLst/>
+          </a:prstGeom>
+          <a:noFill/>
+          <a:ln w="12700">
+            <a:noFill/>
+          </a:ln>
+        </p:spPr>
+        <p:txBody>
+          <a:bodyPr wrap="none" rtlCol="0" anchor="ctr">
+            <a:spAutoFit/>
+          </a:bodyPr>
+          <a:lstStyle>
+            <a:defPPr>
+              <a:defRPr lang="en-US"/>
+            </a:defPPr>
+            <a:lvl1pPr marL="0" algn="l" defTabSz="914400" rtl="0" eaLnBrk="1" latinLnBrk="0" hangingPunct="1">
+              <a:defRPr sz="1800" kern="1200">
+                <a:solidFill>
+                  <a:schemeClr val="tx1"/>
+                </a:solidFill>
+                <a:latin typeface="+mn-lt"/>
+                <a:ea typeface="+mn-ea"/>
+                <a:cs typeface="+mn-cs"/>
+              </a:defRPr>
+            </a:lvl1pPr>
+            <a:lvl2pPr marL="457200" algn="l" defTabSz="914400" rtl="0" eaLnBrk="1" latinLnBrk="0" hangingPunct="1">
+              <a:defRPr sz="1800" kern="1200">
+                <a:solidFill>
+                  <a:schemeClr val="tx1"/>
+                </a:solidFill>
+                <a:latin typeface="+mn-lt"/>
+                <a:ea typeface="+mn-ea"/>
+                <a:cs typeface="+mn-cs"/>
+              </a:defRPr>
+            </a:lvl2pPr>
+            <a:lvl3pPr marL="914400" algn="l" defTabSz="914400" rtl="0" eaLnBrk="1" latinLnBrk="0" hangingPunct="1">
+              <a:defRPr sz="1800" kern="1200">
+                <a:solidFill>
+                  <a:schemeClr val="tx1"/>
+                </a:solidFill>
+                <a:latin typeface="+mn-lt"/>
+                <a:ea typeface="+mn-ea"/>
+                <a:cs typeface="+mn-cs"/>
+              </a:defRPr>
+            </a:lvl3pPr>
+            <a:lvl4pPr marL="1371600" algn="l" defTabSz="914400" rtl="0" eaLnBrk="1" latinLnBrk="0" hangingPunct="1">
+              <a:defRPr sz="1800" kern="1200">
+                <a:solidFill>
+                  <a:schemeClr val="tx1"/>
+                </a:solidFill>
+                <a:latin typeface="+mn-lt"/>
+                <a:ea typeface="+mn-ea"/>
+                <a:cs typeface="+mn-cs"/>
+              </a:defRPr>
+            </a:lvl4pPr>
+            <a:lvl5pPr marL="1828800" algn="l" defTabSz="914400" rtl="0" eaLnBrk="1" latinLnBrk="0" hangingPunct="1">
+              <a:defRPr sz="1800" kern="1200">
+                <a:solidFill>
+                  <a:schemeClr val="tx1"/>
+                </a:solidFill>
+                <a:latin typeface="+mn-lt"/>
+                <a:ea typeface="+mn-ea"/>
+                <a:cs typeface="+mn-cs"/>
+              </a:defRPr>
+            </a:lvl5pPr>
+            <a:lvl6pPr marL="2286000" algn="l" defTabSz="914400" rtl="0" eaLnBrk="1" latinLnBrk="0" hangingPunct="1">
+              <a:defRPr sz="1800" kern="1200">
+                <a:solidFill>
+                  <a:schemeClr val="tx1"/>
+                </a:solidFill>
+                <a:latin typeface="+mn-lt"/>
+                <a:ea typeface="+mn-ea"/>
+                <a:cs typeface="+mn-cs"/>
+              </a:defRPr>
+            </a:lvl6pPr>
+            <a:lvl7pPr marL="2743200" algn="l" defTabSz="914400" rtl="0" eaLnBrk="1" latinLnBrk="0" hangingPunct="1">
+              <a:defRPr sz="1800" kern="1200">
+                <a:solidFill>
+                  <a:schemeClr val="tx1"/>
+                </a:solidFill>
+                <a:latin typeface="+mn-lt"/>
+                <a:ea typeface="+mn-ea"/>
+                <a:cs typeface="+mn-cs"/>
+              </a:defRPr>
+            </a:lvl7pPr>
+            <a:lvl8pPr marL="3200400" algn="l" defTabSz="914400" rtl="0" eaLnBrk="1" latinLnBrk="0" hangingPunct="1">
+              <a:defRPr sz="1800" kern="1200">
+                <a:solidFill>
+                  <a:schemeClr val="tx1"/>
+                </a:solidFill>
+                <a:latin typeface="+mn-lt"/>
+                <a:ea typeface="+mn-ea"/>
+                <a:cs typeface="+mn-cs"/>
+              </a:defRPr>
+            </a:lvl8pPr>
+            <a:lvl9pPr marL="3657600" algn="l" defTabSz="914400" rtl="0" eaLnBrk="1" latinLnBrk="0" hangingPunct="1">
+              <a:defRPr sz="1800" kern="1200">
+                <a:solidFill>
+                  <a:schemeClr val="tx1"/>
+                </a:solidFill>
+                <a:latin typeface="+mn-lt"/>
+                <a:ea typeface="+mn-ea"/>
+                <a:cs typeface="+mn-cs"/>
+              </a:defRPr>
+            </a:lvl9pPr>
+          </a:lstStyle>
+          <a:p>
+            <a:r>
+              <a:rPr lang="en-US" sz="1600" dirty="0" err="1"/>
+              <a:t>Trả</a:t>
+            </a:r>
+            <a:r>
+              <a:rPr lang="en-US" sz="1600" dirty="0"/>
+              <a:t> </a:t>
+            </a:r>
+            <a:r>
+              <a:rPr lang="en-US" sz="1600" dirty="0" err="1"/>
+              <a:t>về</a:t>
+            </a:r>
+            <a:r>
+              <a:rPr lang="en-US" sz="1600" dirty="0"/>
+              <a:t> list </a:t>
+            </a:r>
+            <a:r>
+              <a:rPr lang="en-US" sz="1600" dirty="0" err="1"/>
+              <a:t>nhạc</a:t>
+            </a:r>
+            <a:endParaRPr lang="en-US" sz="1600" dirty="0"/>
+          </a:p>
+        </p:txBody>
+      </p:sp>
+      <p:sp>
+        <p:nvSpPr>
+          <p:cNvPr id="35" name="Rounded Rectangle 63">
+            <a:extLst>
+              <a:ext uri="{FF2B5EF4-FFF2-40B4-BE49-F238E27FC236}">
+                <a16:creationId xmlns:a16="http://schemas.microsoft.com/office/drawing/2014/main" id="{5B655181-1828-46ED-9452-2CC7C7C8B0DA}"/>
+              </a:ext>
+            </a:extLst>
+          </p:cNvPr>
+          <p:cNvSpPr/>
+          <p:nvPr/>
+        </p:nvSpPr>
+        <p:spPr>
+          <a:xfrm>
+            <a:off x="5274402" y="5359337"/>
+            <a:ext cx="2191313" cy="727494"/>
+          </a:xfrm>
+          <a:prstGeom prst="roundRect">
+            <a:avLst/>
+          </a:prstGeom>
+          <a:ln w="19050">
+            <a:solidFill>
+              <a:schemeClr val="accent1"/>
+            </a:solidFill>
+            <a:prstDash val="sysDash"/>
+          </a:ln>
+        </p:spPr>
+        <p:style>
+          <a:lnRef idx="2">
+            <a:schemeClr val="accent2"/>
+          </a:lnRef>
+          <a:fillRef idx="1">
+            <a:schemeClr val="lt1"/>
+          </a:fillRef>
+          <a:effectRef idx="0">
+            <a:schemeClr val="accent2"/>
+          </a:effectRef>
+          <a:fontRef idx="minor">
+            <a:schemeClr val="dk1"/>
+          </a:fontRef>
+        </p:style>
+        <p:txBody>
+          <a:bodyPr rtlCol="0" anchor="ctr"/>
+          <a:lstStyle>
+            <a:defPPr>
+              <a:defRPr lang="en-US"/>
+            </a:defPPr>
+            <a:lvl1pPr marL="0" algn="l" defTabSz="914400" rtl="0" eaLnBrk="1" latinLnBrk="0" hangingPunct="1">
+              <a:defRPr sz="1800" kern="1200">
+                <a:solidFill>
+                  <a:schemeClr val="dk1"/>
+                </a:solidFill>
+                <a:latin typeface="+mn-lt"/>
+                <a:ea typeface="+mn-ea"/>
+                <a:cs typeface="+mn-cs"/>
+              </a:defRPr>
+            </a:lvl1pPr>
+            <a:lvl2pPr marL="457200" algn="l" defTabSz="914400" rtl="0" eaLnBrk="1" latinLnBrk="0" hangingPunct="1">
+              <a:defRPr sz="1800" kern="1200">
+                <a:solidFill>
+                  <a:schemeClr val="dk1"/>
+                </a:solidFill>
+                <a:latin typeface="+mn-lt"/>
+                <a:ea typeface="+mn-ea"/>
+                <a:cs typeface="+mn-cs"/>
+              </a:defRPr>
+            </a:lvl2pPr>
+            <a:lvl3pPr marL="914400" algn="l" defTabSz="914400" rtl="0" eaLnBrk="1" latinLnBrk="0" hangingPunct="1">
+              <a:defRPr sz="1800" kern="1200">
+                <a:solidFill>
+                  <a:schemeClr val="dk1"/>
+                </a:solidFill>
+                <a:latin typeface="+mn-lt"/>
+                <a:ea typeface="+mn-ea"/>
+                <a:cs typeface="+mn-cs"/>
+              </a:defRPr>
+            </a:lvl3pPr>
+            <a:lvl4pPr marL="1371600" algn="l" defTabSz="914400" rtl="0" eaLnBrk="1" latinLnBrk="0" hangingPunct="1">
+              <a:defRPr sz="1800" kern="1200">
+                <a:solidFill>
+                  <a:schemeClr val="dk1"/>
+                </a:solidFill>
+                <a:latin typeface="+mn-lt"/>
+                <a:ea typeface="+mn-ea"/>
+                <a:cs typeface="+mn-cs"/>
+              </a:defRPr>
+            </a:lvl4pPr>
+            <a:lvl5pPr marL="1828800" algn="l" defTabSz="914400" rtl="0" eaLnBrk="1" latinLnBrk="0" hangingPunct="1">
+              <a:defRPr sz="1800" kern="1200">
+                <a:solidFill>
+                  <a:schemeClr val="dk1"/>
+                </a:solidFill>
+                <a:latin typeface="+mn-lt"/>
+                <a:ea typeface="+mn-ea"/>
+                <a:cs typeface="+mn-cs"/>
+              </a:defRPr>
+            </a:lvl5pPr>
+            <a:lvl6pPr marL="2286000" algn="l" defTabSz="914400" rtl="0" eaLnBrk="1" latinLnBrk="0" hangingPunct="1">
+              <a:defRPr sz="1800" kern="1200">
+                <a:solidFill>
+                  <a:schemeClr val="dk1"/>
+                </a:solidFill>
+                <a:latin typeface="+mn-lt"/>
+                <a:ea typeface="+mn-ea"/>
+                <a:cs typeface="+mn-cs"/>
+              </a:defRPr>
+            </a:lvl6pPr>
+            <a:lvl7pPr marL="2743200" algn="l" defTabSz="914400" rtl="0" eaLnBrk="1" latinLnBrk="0" hangingPunct="1">
+              <a:defRPr sz="1800" kern="1200">
+                <a:solidFill>
+                  <a:schemeClr val="dk1"/>
+                </a:solidFill>
+                <a:latin typeface="+mn-lt"/>
+                <a:ea typeface="+mn-ea"/>
+                <a:cs typeface="+mn-cs"/>
+              </a:defRPr>
+            </a:lvl7pPr>
+            <a:lvl8pPr marL="3200400" algn="l" defTabSz="914400" rtl="0" eaLnBrk="1" latinLnBrk="0" hangingPunct="1">
+              <a:defRPr sz="1800" kern="1200">
+                <a:solidFill>
+                  <a:schemeClr val="dk1"/>
+                </a:solidFill>
+                <a:latin typeface="+mn-lt"/>
+                <a:ea typeface="+mn-ea"/>
+                <a:cs typeface="+mn-cs"/>
+              </a:defRPr>
+            </a:lvl8pPr>
+            <a:lvl9pPr marL="3657600" algn="l" defTabSz="914400" rtl="0" eaLnBrk="1" latinLnBrk="0" hangingPunct="1">
+              <a:defRPr sz="1800" kern="1200">
+                <a:solidFill>
+                  <a:schemeClr val="dk1"/>
+                </a:solidFill>
+                <a:latin typeface="+mn-lt"/>
+                <a:ea typeface="+mn-ea"/>
+                <a:cs typeface="+mn-cs"/>
+              </a:defRPr>
+            </a:lvl9pPr>
+          </a:lstStyle>
+          <a:p>
+            <a:pPr algn="r"/>
+            <a:r>
+              <a:rPr lang="en-US" sz="1600" dirty="0"/>
+              <a:t>AWS </a:t>
+            </a:r>
+            <a:r>
+              <a:rPr lang="en-US" sz="1600" dirty="0" err="1"/>
+              <a:t>DynamoDb</a:t>
+            </a:r>
+            <a:endParaRPr lang="en-US" sz="1600" dirty="0"/>
+          </a:p>
+        </p:txBody>
+      </p:sp>
+      <p:pic>
+        <p:nvPicPr>
+          <p:cNvPr id="36" name="Hình ảnh 35">
+            <a:extLst>
+              <a:ext uri="{FF2B5EF4-FFF2-40B4-BE49-F238E27FC236}">
+                <a16:creationId xmlns:a16="http://schemas.microsoft.com/office/drawing/2014/main" id="{2574149B-1FF7-47C5-9FB7-1587F93FEB52}"/>
+              </a:ext>
+            </a:extLst>
+          </p:cNvPr>
+          <p:cNvPicPr>
+            <a:picLocks noChangeAspect="1"/>
+          </p:cNvPicPr>
+          <p:nvPr/>
+        </p:nvPicPr>
+        <p:blipFill>
+          <a:blip r:embed="rId6"/>
+          <a:stretch>
+            <a:fillRect/>
+          </a:stretch>
+        </p:blipFill>
+        <p:spPr>
+          <a:xfrm>
+            <a:off x="5390647" y="5468279"/>
+            <a:ext cx="486244" cy="509607"/>
+          </a:xfrm>
+          <a:prstGeom prst="rect">
+            <a:avLst/>
+          </a:prstGeom>
+        </p:spPr>
+      </p:pic>
+      <p:cxnSp>
+        <p:nvCxnSpPr>
+          <p:cNvPr id="37" name="Curved Connector 102">
+            <a:extLst>
+              <a:ext uri="{FF2B5EF4-FFF2-40B4-BE49-F238E27FC236}">
+                <a16:creationId xmlns:a16="http://schemas.microsoft.com/office/drawing/2014/main" id="{DB313802-4FC6-4AF9-A3FA-EAAA96BA9047}"/>
+              </a:ext>
+            </a:extLst>
+          </p:cNvPr>
+          <p:cNvCxnSpPr>
+            <a:cxnSpLocks/>
+          </p:cNvCxnSpPr>
+          <p:nvPr/>
+        </p:nvCxnSpPr>
+        <p:spPr>
+          <a:xfrm rot="16200000" flipV="1">
+            <a:off x="5878277" y="4885367"/>
+            <a:ext cx="938708" cy="9232"/>
+          </a:xfrm>
+          <a:prstGeom prst="curvedConnector3">
+            <a:avLst>
+              <a:gd name="adj1" fmla="val 50000"/>
+            </a:avLst>
+          </a:prstGeom>
+          <a:ln w="19050" cap="flat" cmpd="sng" algn="ctr">
+            <a:solidFill>
+              <a:schemeClr val="accent1"/>
+            </a:solidFill>
+            <a:prstDash val="sysDash"/>
+            <a:round/>
+            <a:headEnd type="arrow" w="med" len="med"/>
+            <a:tailEnd type="arrow" w="med" len="med"/>
+          </a:ln>
+        </p:spPr>
+        <p:style>
+          <a:lnRef idx="0">
+            <a:scrgbClr r="0" g="0" b="0"/>
+          </a:lnRef>
+          <a:fillRef idx="0">
+            <a:scrgbClr r="0" g="0" b="0"/>
+          </a:fillRef>
+          <a:effectRef idx="0">
+            <a:scrgbClr r="0" g="0" b="0"/>
+          </a:effectRef>
+          <a:fontRef idx="minor">
+            <a:schemeClr val="tx1"/>
+          </a:fontRef>
+        </p:style>
+      </p:cxnSp>
+      <p:sp>
+        <p:nvSpPr>
+          <p:cNvPr id="38" name="TextBox 45">
+            <a:extLst>
+              <a:ext uri="{FF2B5EF4-FFF2-40B4-BE49-F238E27FC236}">
+                <a16:creationId xmlns:a16="http://schemas.microsoft.com/office/drawing/2014/main" id="{E1F5A0A0-60FA-43E5-BFA5-6AE40D8F671A}"/>
+              </a:ext>
+            </a:extLst>
+          </p:cNvPr>
+          <p:cNvSpPr txBox="1"/>
+          <p:nvPr/>
+        </p:nvSpPr>
+        <p:spPr>
+          <a:xfrm>
+            <a:off x="6223204" y="4731740"/>
+            <a:ext cx="1633262" cy="338554"/>
+          </a:xfrm>
+          <a:prstGeom prst="rect">
+            <a:avLst/>
+          </a:prstGeom>
+          <a:noFill/>
+          <a:ln w="12700">
+            <a:noFill/>
+          </a:ln>
+        </p:spPr>
+        <p:txBody>
+          <a:bodyPr wrap="square" rtlCol="0" anchor="ctr">
+            <a:spAutoFit/>
+          </a:bodyPr>
+          <a:lstStyle>
+            <a:defPPr>
+              <a:defRPr lang="en-US"/>
+            </a:defPPr>
+            <a:lvl1pPr marL="0" algn="l" defTabSz="914400" rtl="0" eaLnBrk="1" latinLnBrk="0" hangingPunct="1">
+              <a:defRPr sz="1800" kern="1200">
+                <a:solidFill>
+                  <a:schemeClr val="tx1"/>
+                </a:solidFill>
+                <a:latin typeface="+mn-lt"/>
+                <a:ea typeface="+mn-ea"/>
+                <a:cs typeface="+mn-cs"/>
+              </a:defRPr>
+            </a:lvl1pPr>
+            <a:lvl2pPr marL="457200" algn="l" defTabSz="914400" rtl="0" eaLnBrk="1" latinLnBrk="0" hangingPunct="1">
+              <a:defRPr sz="1800" kern="1200">
+                <a:solidFill>
+                  <a:schemeClr val="tx1"/>
+                </a:solidFill>
+                <a:latin typeface="+mn-lt"/>
+                <a:ea typeface="+mn-ea"/>
+                <a:cs typeface="+mn-cs"/>
+              </a:defRPr>
+            </a:lvl2pPr>
+            <a:lvl3pPr marL="914400" algn="l" defTabSz="914400" rtl="0" eaLnBrk="1" latinLnBrk="0" hangingPunct="1">
+              <a:defRPr sz="1800" kern="1200">
+                <a:solidFill>
+                  <a:schemeClr val="tx1"/>
+                </a:solidFill>
+                <a:latin typeface="+mn-lt"/>
+                <a:ea typeface="+mn-ea"/>
+                <a:cs typeface="+mn-cs"/>
+              </a:defRPr>
+            </a:lvl3pPr>
+            <a:lvl4pPr marL="1371600" algn="l" defTabSz="914400" rtl="0" eaLnBrk="1" latinLnBrk="0" hangingPunct="1">
+              <a:defRPr sz="1800" kern="1200">
+                <a:solidFill>
+                  <a:schemeClr val="tx1"/>
+                </a:solidFill>
+                <a:latin typeface="+mn-lt"/>
+                <a:ea typeface="+mn-ea"/>
+                <a:cs typeface="+mn-cs"/>
+              </a:defRPr>
+            </a:lvl4pPr>
+            <a:lvl5pPr marL="1828800" algn="l" defTabSz="914400" rtl="0" eaLnBrk="1" latinLnBrk="0" hangingPunct="1">
+              <a:defRPr sz="1800" kern="1200">
+                <a:solidFill>
+                  <a:schemeClr val="tx1"/>
+                </a:solidFill>
+                <a:latin typeface="+mn-lt"/>
+                <a:ea typeface="+mn-ea"/>
+                <a:cs typeface="+mn-cs"/>
+              </a:defRPr>
+            </a:lvl5pPr>
+            <a:lvl6pPr marL="2286000" algn="l" defTabSz="914400" rtl="0" eaLnBrk="1" latinLnBrk="0" hangingPunct="1">
+              <a:defRPr sz="1800" kern="1200">
+                <a:solidFill>
+                  <a:schemeClr val="tx1"/>
+                </a:solidFill>
+                <a:latin typeface="+mn-lt"/>
+                <a:ea typeface="+mn-ea"/>
+                <a:cs typeface="+mn-cs"/>
+              </a:defRPr>
+            </a:lvl6pPr>
+            <a:lvl7pPr marL="2743200" algn="l" defTabSz="914400" rtl="0" eaLnBrk="1" latinLnBrk="0" hangingPunct="1">
+              <a:defRPr sz="1800" kern="1200">
+                <a:solidFill>
+                  <a:schemeClr val="tx1"/>
+                </a:solidFill>
+                <a:latin typeface="+mn-lt"/>
+                <a:ea typeface="+mn-ea"/>
+                <a:cs typeface="+mn-cs"/>
+              </a:defRPr>
+            </a:lvl7pPr>
+            <a:lvl8pPr marL="3200400" algn="l" defTabSz="914400" rtl="0" eaLnBrk="1" latinLnBrk="0" hangingPunct="1">
+              <a:defRPr sz="1800" kern="1200">
+                <a:solidFill>
+                  <a:schemeClr val="tx1"/>
+                </a:solidFill>
+                <a:latin typeface="+mn-lt"/>
+                <a:ea typeface="+mn-ea"/>
+                <a:cs typeface="+mn-cs"/>
+              </a:defRPr>
+            </a:lvl8pPr>
+            <a:lvl9pPr marL="3657600" algn="l" defTabSz="914400" rtl="0" eaLnBrk="1" latinLnBrk="0" hangingPunct="1">
+              <a:defRPr sz="1800" kern="1200">
+                <a:solidFill>
+                  <a:schemeClr val="tx1"/>
+                </a:solidFill>
+                <a:latin typeface="+mn-lt"/>
+                <a:ea typeface="+mn-ea"/>
+                <a:cs typeface="+mn-cs"/>
+              </a:defRPr>
+            </a:lvl9pPr>
+          </a:lstStyle>
+          <a:p>
+            <a:pPr algn="ctr"/>
+            <a:r>
+              <a:rPr lang="en-US" sz="1600" dirty="0" err="1"/>
+              <a:t>Lưu</a:t>
+            </a:r>
+            <a:r>
+              <a:rPr lang="en-US" sz="1600" dirty="0"/>
+              <a:t> </a:t>
+            </a:r>
+            <a:r>
+              <a:rPr lang="en-US" sz="1600" dirty="0" err="1"/>
+              <a:t>trạng</a:t>
+            </a:r>
+            <a:r>
+              <a:rPr lang="en-US" sz="1600" dirty="0"/>
+              <a:t> </a:t>
+            </a:r>
+            <a:r>
+              <a:rPr lang="en-US" sz="1600" dirty="0" err="1"/>
+              <a:t>thái</a:t>
+            </a:r>
+            <a:endParaRPr lang="en-US" sz="1600" dirty="0"/>
+          </a:p>
+        </p:txBody>
+      </p:sp>
+    </p:spTree>
+    <p:extLst>
+      <p:ext uri="{BB962C8B-B14F-4D97-AF65-F5344CB8AC3E}">
+        <p14:creationId xmlns:p14="http://schemas.microsoft.com/office/powerpoint/2010/main" val="944313172"/>
       </p:ext>
     </p:extLst>
   </p:cSld>
@@ -6419,7 +8434,7 @@
 </p:sld>
 </file>
 
-<file path=ppt/slides/slide3.xml><?xml version="1.0" encoding="utf-8"?>
+<file path=ppt/slides/slide6.xml><?xml version="1.0" encoding="utf-8"?>
 <p:sld xmlns:a="http://schemas.openxmlformats.org/drawingml/2006/main" xmlns:r="http://schemas.openxmlformats.org/officeDocument/2006/relationships" xmlns:p="http://schemas.openxmlformats.org/presentationml/2006/main">
   <p:cSld>
     <p:spTree>
@@ -6441,7 +8456,7 @@
           <p:cNvPr id="2" name="Tiêu đề 1">
             <a:extLst>
               <a:ext uri="{FF2B5EF4-FFF2-40B4-BE49-F238E27FC236}">
-                <a16:creationId xmlns:a16="http://schemas.microsoft.com/office/drawing/2014/main" id="{395C4E5F-9B88-4AE8-AFB1-7FC0372546C2}"/>
+                <a16:creationId xmlns:a16="http://schemas.microsoft.com/office/drawing/2014/main" id="{DD63F4BD-35DE-41A7-BA01-01DFF687E3C3}"/>
               </a:ext>
             </a:extLst>
           </p:cNvPr>
@@ -6452,19 +8467,14 @@
             <p:ph type="title"/>
           </p:nvPr>
         </p:nvSpPr>
-        <p:spPr>
-          <a:xfrm>
-            <a:off x="570914" y="365125"/>
-            <a:ext cx="10515600" cy="1325563"/>
-          </a:xfrm>
-        </p:spPr>
+        <p:spPr/>
         <p:txBody>
           <a:bodyPr/>
           <a:lstStyle/>
           <a:p>
             <a:r>
               <a:rPr lang="en-US" dirty="0" err="1"/>
-              <a:t>Thiết</a:t>
+              <a:t>Tài</a:t>
             </a:r>
             <a:r>
               <a:rPr lang="en-US" dirty="0"/>
@@ -6472,54 +8482,105 @@
             </a:r>
             <a:r>
               <a:rPr lang="en-US" dirty="0" err="1"/>
-              <a:t>kế</a:t>
+              <a:t>liệu</a:t>
             </a:r>
             <a:r>
               <a:rPr lang="en-US" dirty="0"/>
-              <a:t> VUI</a:t>
-            </a:r>
-          </a:p>
-        </p:txBody>
-      </p:sp>
-      <p:pic>
-        <p:nvPicPr>
-          <p:cNvPr id="8" name="Chỗ dành sẵn cho Nội dung 7">
-            <a:extLst>
-              <a:ext uri="{FF2B5EF4-FFF2-40B4-BE49-F238E27FC236}">
-                <a16:creationId xmlns:a16="http://schemas.microsoft.com/office/drawing/2014/main" id="{ADECE981-85FB-4FD2-8E6F-68206E21733B}"/>
-              </a:ext>
-            </a:extLst>
-          </p:cNvPr>
-          <p:cNvPicPr>
-            <a:picLocks noGrp="1" noChangeAspect="1"/>
-          </p:cNvPicPr>
+              <a:t> </a:t>
+            </a:r>
+            <a:r>
+              <a:rPr lang="en-US" dirty="0" err="1"/>
+              <a:t>sử</a:t>
+            </a:r>
+            <a:r>
+              <a:rPr lang="en-US" dirty="0"/>
+              <a:t> </a:t>
+            </a:r>
+            <a:r>
+              <a:rPr lang="en-US" dirty="0" err="1"/>
+              <a:t>dụng</a:t>
+            </a:r>
+            <a:r>
+              <a:rPr lang="en-US" dirty="0"/>
+              <a:t> </a:t>
+            </a:r>
+            <a:r>
+              <a:rPr lang="en-US" dirty="0" err="1"/>
+              <a:t>trong</a:t>
+            </a:r>
+            <a:r>
+              <a:rPr lang="en-US" dirty="0"/>
+              <a:t> </a:t>
+            </a:r>
+            <a:r>
+              <a:rPr lang="en-US" dirty="0" err="1"/>
+              <a:t>bài</a:t>
+            </a:r>
+            <a:r>
+              <a:rPr lang="en-US" dirty="0"/>
+              <a:t> </a:t>
+            </a:r>
+            <a:r>
+              <a:rPr lang="en-US" dirty="0" err="1"/>
+              <a:t>học</a:t>
+            </a:r>
+            <a:endParaRPr lang="en-US" dirty="0"/>
+          </a:p>
+        </p:txBody>
+      </p:sp>
+      <p:sp>
+        <p:nvSpPr>
+          <p:cNvPr id="3" name="Chỗ dành sẵn cho Nội dung 2">
+            <a:extLst>
+              <a:ext uri="{FF2B5EF4-FFF2-40B4-BE49-F238E27FC236}">
+                <a16:creationId xmlns:a16="http://schemas.microsoft.com/office/drawing/2014/main" id="{7BC946C3-651F-4C92-80C9-F10FD0F2CBE9}"/>
+              </a:ext>
+            </a:extLst>
+          </p:cNvPr>
+          <p:cNvSpPr>
+            <a:spLocks noGrp="1"/>
+          </p:cNvSpPr>
           <p:nvPr>
             <p:ph idx="1"/>
           </p:nvPr>
-        </p:nvPicPr>
-        <p:blipFill>
-          <a:blip r:embed="rId2">
-            <a:extLst>
-              <a:ext uri="{28A0092B-C50C-407E-A947-70E740481C1C}">
-                <a14:useLocalDpi xmlns:a14="http://schemas.microsoft.com/office/drawing/2010/main" val="0"/>
-              </a:ext>
-            </a:extLst>
-          </a:blip>
-          <a:stretch>
-            <a:fillRect/>
-          </a:stretch>
-        </p:blipFill>
-        <p:spPr>
-          <a:xfrm>
-            <a:off x="4832666" y="1027906"/>
-            <a:ext cx="5831728" cy="4351338"/>
-          </a:xfrm>
-        </p:spPr>
-      </p:pic>
+        </p:nvSpPr>
+        <p:spPr/>
+        <p:txBody>
+          <a:bodyPr/>
+          <a:lstStyle/>
+          <a:p>
+            <a:endParaRPr lang="en-US" dirty="0"/>
+          </a:p>
+          <a:p>
+            <a:pPr marL="0" indent="0">
+              <a:buNone/>
+            </a:pPr>
+            <a:r>
+              <a:rPr lang="en-US" dirty="0">
+                <a:hlinkClick r:id="rId2"/>
+              </a:rPr>
+              <a:t>https://github.com/Huong-nt</a:t>
+            </a:r>
+            <a:r>
+              <a:rPr lang="en-US">
+                <a:hlinkClick r:id="rId2"/>
+              </a:rPr>
+              <a:t>/EduMall-KhoaHocIOT</a:t>
+            </a:r>
+            <a:endParaRPr lang="en-US"/>
+          </a:p>
+          <a:p>
+            <a:pPr marL="0" indent="0">
+              <a:buNone/>
+            </a:pPr>
+            <a:endParaRPr lang="en-US" dirty="0"/>
+          </a:p>
+        </p:txBody>
+      </p:sp>
     </p:spTree>
     <p:extLst>
       <p:ext uri="{BB962C8B-B14F-4D97-AF65-F5344CB8AC3E}">
-        <p14:creationId xmlns:p14="http://schemas.microsoft.com/office/powerpoint/2010/main" val="1384107881"/>
+        <p14:creationId xmlns:p14="http://schemas.microsoft.com/office/powerpoint/2010/main" val="3451230672"/>
       </p:ext>
     </p:extLst>
   </p:cSld>
@@ -6529,73 +8590,7 @@
 </p:sld>
 </file>
 
-<file path=ppt/slides/slide4.xml><?xml version="1.0" encoding="utf-8"?>
-<p:sld xmlns:a="http://schemas.openxmlformats.org/drawingml/2006/main" xmlns:r="http://schemas.openxmlformats.org/officeDocument/2006/relationships" xmlns:p="http://schemas.openxmlformats.org/presentationml/2006/main">
-  <p:cSld>
-    <p:spTree>
-      <p:nvGrpSpPr>
-        <p:cNvPr id="1" name=""/>
-        <p:cNvGrpSpPr/>
-        <p:nvPr/>
-      </p:nvGrpSpPr>
-      <p:grpSpPr>
-        <a:xfrm>
-          <a:off x="0" y="0"/>
-          <a:ext cx="0" cy="0"/>
-          <a:chOff x="0" y="0"/>
-          <a:chExt cx="0" cy="0"/>
-        </a:xfrm>
-      </p:grpSpPr>
-      <p:pic>
-        <p:nvPicPr>
-          <p:cNvPr id="4" name="Chỗ dành sẵn cho Nội dung 7">
-            <a:extLst>
-              <a:ext uri="{FF2B5EF4-FFF2-40B4-BE49-F238E27FC236}">
-                <a16:creationId xmlns:a16="http://schemas.microsoft.com/office/drawing/2014/main" id="{E4F729AF-E856-4482-9191-5A27565071F9}"/>
-              </a:ext>
-            </a:extLst>
-          </p:cNvPr>
-          <p:cNvPicPr>
-            <a:picLocks noChangeAspect="1"/>
-          </p:cNvPicPr>
-          <p:nvPr/>
-        </p:nvPicPr>
-        <p:blipFill>
-          <a:blip r:embed="rId2">
-            <a:extLst>
-              <a:ext uri="{28A0092B-C50C-407E-A947-70E740481C1C}">
-                <a14:useLocalDpi xmlns:a14="http://schemas.microsoft.com/office/drawing/2010/main" val="0"/>
-              </a:ext>
-            </a:extLst>
-          </a:blip>
-          <a:stretch>
-            <a:fillRect/>
-          </a:stretch>
-        </p:blipFill>
-        <p:spPr>
-          <a:xfrm>
-            <a:off x="1410157" y="109195"/>
-            <a:ext cx="9044849" cy="6748805"/>
-          </a:xfrm>
-          <a:prstGeom prst="rect">
-            <a:avLst/>
-          </a:prstGeom>
-        </p:spPr>
-      </p:pic>
-    </p:spTree>
-    <p:extLst>
-      <p:ext uri="{BB962C8B-B14F-4D97-AF65-F5344CB8AC3E}">
-        <p14:creationId xmlns:p14="http://schemas.microsoft.com/office/powerpoint/2010/main" val="918245605"/>
-      </p:ext>
-    </p:extLst>
-  </p:cSld>
-  <p:clrMapOvr>
-    <a:masterClrMapping/>
-  </p:clrMapOvr>
-</p:sld>
-</file>
-
-<file path=ppt/slides/slide5.xml><?xml version="1.0" encoding="utf-8"?>
+<file path=ppt/slides/slide7.xml><?xml version="1.0" encoding="utf-8"?>
 <p:sld xmlns:a="http://schemas.openxmlformats.org/drawingml/2006/main" xmlns:r="http://schemas.openxmlformats.org/officeDocument/2006/relationships" xmlns:p="http://schemas.openxmlformats.org/presentationml/2006/main">
   <p:cSld>
     <p:spTree>

</xml_diff>